<commit_message>
Notes added to Slidedeck
</commit_message>
<xml_diff>
--- a/Slides/20091123_XpDays_AgileAcceptanceTesting.pptx
+++ b/Slides/20091123_XpDays_AgileAcceptanceTesting.pptx
@@ -223,7 +223,8 @@
           <a:p>
             <a:fld id="{7E752524-4858-4B26-B945-9A6E6F77C137}" type="datetimeFigureOut">
               <a:rPr lang="nl-BE" smtClean="0"/>
-              <a:t>03/11/2009</a:t>
+              <a:pPr/>
+              <a:t>22/11/2009</a:t>
             </a:fld>
             <a:endParaRPr lang="nl-BE"/>
           </a:p>
@@ -289,6 +290,7 @@
           <a:p>
             <a:fld id="{835EC152-7AC3-4268-91B3-ED3369D28F16}" type="slidenum">
               <a:rPr lang="nl-BE" smtClean="0"/>
+              <a:pPr/>
               <a:t>‹#›</a:t>
             </a:fld>
             <a:endParaRPr lang="nl-BE"/>
@@ -384,7 +386,7 @@
             <a:fld id="{08F0785E-033A-43CD-AF7D-1A09C6890A39}" type="datetimeFigureOut">
               <a:rPr lang="nl-BE" smtClean="0"/>
               <a:pPr/>
-              <a:t>03/11/2009</a:t>
+              <a:t>22/11/2009</a:t>
             </a:fld>
             <a:endParaRPr lang="nl-BE"/>
           </a:p>
@@ -697,15 +699,15 @@
           <a:lstStyle/>
           <a:p>
             <a:r>
-              <a:rPr lang="nl-BE" dirty="0" smtClean="0"/>
-              <a:t>Introduce ourselves.</a:t>
-            </a:r>
-          </a:p>
-          <a:p>
-            <a:r>
-              <a:rPr lang="nl-BE" dirty="0" smtClean="0"/>
-              <a:t>Hand-out this as a reference A5 @ the end of the session.</a:t>
-            </a:r>
+              <a:rPr lang="nl-BE" b="1" dirty="0" smtClean="0"/>
+              <a:t>Start</a:t>
+            </a:r>
+            <a:r>
+              <a:rPr lang="nl-BE" b="1" baseline="0" dirty="0" smtClean="0"/>
+              <a:t> XpDays timer: 90’</a:t>
+            </a:r>
+          </a:p>
+          <a:p>
             <a:endParaRPr lang="nl-BE" dirty="0"/>
           </a:p>
         </p:txBody>
@@ -728,7 +730,7 @@
             <a:fld id="{A95F721D-B08F-41E9-83C2-423A43044BB2}" type="slidenum">
               <a:rPr lang="nl-BE" smtClean="0"/>
               <a:pPr/>
-              <a:t>2</a:t>
+              <a:t>1</a:t>
             </a:fld>
             <a:endParaRPr lang="nl-BE"/>
           </a:p>
@@ -784,35 +786,118 @@
         <p:spPr/>
         <p:txBody>
           <a:bodyPr>
-            <a:normAutofit/>
+            <a:normAutofit lnSpcReduction="10000"/>
           </a:bodyPr>
           <a:lstStyle/>
           <a:p>
-            <a:pPr defTabSz="966612">
-              <a:defRPr/>
+            <a:r>
+              <a:rPr lang="nl-BE" u="none" baseline="0" dirty="0" smtClean="0"/>
+              <a:t>In iteration 1, we will implement the first user story.</a:t>
+            </a:r>
+          </a:p>
+          <a:p>
+            <a:endParaRPr lang="nl-BE" u="sng" baseline="0" dirty="0" smtClean="0"/>
+          </a:p>
+          <a:p>
+            <a:r>
+              <a:rPr lang="nl-BE" u="sng" baseline="0" dirty="0" smtClean="0"/>
+              <a:t>The user story will appear on our task board in this nice layout:</a:t>
+            </a:r>
+          </a:p>
+          <a:p>
+            <a:pPr>
+              <a:buFontTx/>
+              <a:buChar char="-"/>
             </a:pPr>
             <a:r>
-              <a:rPr lang="nl-BE" dirty="0" smtClean="0"/>
-              <a:t>Lets turn those examples into executable specifications to verify that we have build the right code.</a:t>
-            </a:r>
-          </a:p>
-          <a:p>
-            <a:pPr defTabSz="966612">
-              <a:defRPr/>
+              <a:rPr lang="nl-BE" u="none" baseline="0" dirty="0" smtClean="0"/>
+              <a:t>The user story itself described on top (</a:t>
+            </a:r>
+            <a:r>
+              <a:rPr lang="nl-BE" b="1" u="none" baseline="0" dirty="0" smtClean="0"/>
+              <a:t>as a – I want – because)</a:t>
+            </a:r>
+            <a:endParaRPr lang="nl-BE" b="0" u="none" baseline="0" dirty="0" smtClean="0"/>
+          </a:p>
+          <a:p>
+            <a:pPr>
+              <a:buFontTx/>
+              <a:buChar char="-"/>
             </a:pPr>
-            <a:endParaRPr lang="nl-BE" dirty="0" smtClean="0"/>
-          </a:p>
-          <a:p>
-            <a:pPr defTabSz="966612">
-              <a:defRPr/>
+            <a:r>
+              <a:rPr lang="nl-BE" b="0" u="none" baseline="0" dirty="0" smtClean="0"/>
+              <a:t>The customer described how he wants to see a demo of the functionality</a:t>
+            </a:r>
+          </a:p>
+          <a:p>
+            <a:pPr>
+              <a:buFontTx/>
+              <a:buChar char="-"/>
             </a:pPr>
             <a:r>
-              <a:rPr lang="nl-BE" dirty="0" smtClean="0"/>
-              <a:t>Elaborate -&gt; to describe more in detail</a:t>
-            </a:r>
-          </a:p>
-          <a:p>
-            <a:endParaRPr lang="nl-BE" dirty="0"/>
+              <a:rPr lang="nl-BE" b="0" u="none" baseline="0" dirty="0" smtClean="0"/>
+              <a:t>The acceptance criteria are defined</a:t>
+            </a:r>
+          </a:p>
+          <a:p>
+            <a:pPr>
+              <a:buFontTx/>
+              <a:buChar char="-"/>
+            </a:pPr>
+            <a:r>
+              <a:rPr lang="nl-BE" b="0" u="none" baseline="0" dirty="0" smtClean="0"/>
+              <a:t>The story is estimated in size (storypoints) and in business value. The combination of those define the priority.</a:t>
+            </a:r>
+          </a:p>
+          <a:p>
+            <a:pPr>
+              <a:buFontTx/>
+              <a:buChar char="-"/>
+            </a:pPr>
+            <a:r>
+              <a:rPr lang="nl-BE" b="0" u="none" baseline="0" dirty="0" smtClean="0"/>
+              <a:t>Backlog Id for the backend planning system.</a:t>
+            </a:r>
+          </a:p>
+          <a:p>
+            <a:pPr>
+              <a:buFontTx/>
+              <a:buChar char="-"/>
+            </a:pPr>
+            <a:r>
+              <a:rPr lang="nl-BE" b="0" u="none" baseline="0" dirty="0" smtClean="0"/>
+              <a:t>DoD checkbox where the team can check if the Definition-of-Done is met for this user story.</a:t>
+            </a:r>
+            <a:endParaRPr lang="nl-BE" u="none" baseline="0" dirty="0" smtClean="0"/>
+          </a:p>
+          <a:p>
+            <a:endParaRPr lang="nl-BE" u="sng" baseline="0" dirty="0" smtClean="0"/>
+          </a:p>
+          <a:p>
+            <a:r>
+              <a:rPr lang="nl-BE" u="sng" baseline="0" dirty="0" smtClean="0"/>
+              <a:t>Iteration flow:</a:t>
+            </a:r>
+          </a:p>
+          <a:p>
+            <a:pPr>
+              <a:buFontTx/>
+              <a:buChar char="-"/>
+            </a:pPr>
+            <a:r>
+              <a:rPr lang="nl-BE" u="none" baseline="0" dirty="0" smtClean="0"/>
+              <a:t>Specification Workshop</a:t>
+            </a:r>
+          </a:p>
+          <a:p>
+            <a:pPr>
+              <a:buFontTx/>
+              <a:buChar char="-"/>
+            </a:pPr>
+            <a:r>
+              <a:rPr lang="nl-BE" u="none" baseline="0" dirty="0" smtClean="0"/>
+              <a:t>Implementation itself</a:t>
+            </a:r>
           </a:p>
         </p:txBody>
       </p:sp>
@@ -834,7 +919,7 @@
             <a:fld id="{A95F721D-B08F-41E9-83C2-423A43044BB2}" type="slidenum">
               <a:rPr lang="nl-BE" smtClean="0"/>
               <a:pPr/>
-              <a:t>12</a:t>
+              <a:t>10</a:t>
             </a:fld>
             <a:endParaRPr lang="nl-BE"/>
           </a:p>
@@ -890,15 +975,20 @@
         <p:spPr/>
         <p:txBody>
           <a:bodyPr>
-            <a:normAutofit/>
+            <a:normAutofit lnSpcReduction="10000"/>
           </a:bodyPr>
           <a:lstStyle/>
           <a:p>
-            <a:pPr lvl="1">
-              <a:buFontTx/>
-              <a:buChar char="-"/>
-            </a:pPr>
-            <a:endParaRPr lang="nl-BE" baseline="0" dirty="0" smtClean="0"/>
+            <a:r>
+              <a:rPr lang="nl-BE" u="sng" baseline="0" dirty="0" smtClean="0"/>
+              <a:t>Specification Workshop:</a:t>
+            </a:r>
+          </a:p>
+          <a:p>
+            <a:r>
+              <a:rPr lang="nl-BE" u="none" baseline="0" dirty="0" smtClean="0"/>
+              <a:t>- Quickly make groups of 4 people.</a:t>
+            </a:r>
           </a:p>
           <a:p>
             <a:pPr>
@@ -906,8 +996,8 @@
               <a:buChar char="-"/>
             </a:pPr>
             <a:r>
-              <a:rPr lang="nl-BE" baseline="0" dirty="0" smtClean="0"/>
-              <a:t> Een eenvoudige testcase uit de specification workshop toelichten aan de Flipchart voor de anderen</a:t>
+              <a:rPr lang="nl-BE" u="none" baseline="0" dirty="0" smtClean="0"/>
+              <a:t> Hand the index card of the first user story to each group.</a:t>
             </a:r>
           </a:p>
           <a:p>
@@ -915,7 +1005,212 @@
               <a:buFontTx/>
               <a:buChar char="-"/>
             </a:pPr>
-            <a:endParaRPr lang="nl-BE" dirty="0" smtClean="0"/>
+            <a:r>
+              <a:rPr lang="nl-BE" u="none" baseline="0" dirty="0" smtClean="0"/>
+              <a:t> On the flip chart, write the template </a:t>
+            </a:r>
+            <a:r>
+              <a:rPr lang="nl-BE" b="1" u="none" baseline="0" dirty="0" smtClean="0"/>
+              <a:t>Given – When – Then </a:t>
+            </a:r>
+          </a:p>
+          <a:p>
+            <a:pPr>
+              <a:buFontTx/>
+              <a:buChar char="-"/>
+            </a:pPr>
+            <a:r>
+              <a:rPr lang="nl-BE" b="1" u="none" baseline="0" dirty="0" smtClean="0"/>
+              <a:t> </a:t>
+            </a:r>
+            <a:r>
+              <a:rPr lang="nl-BE" b="0" u="none" baseline="0" dirty="0" smtClean="0"/>
+              <a:t>On the flip chart, give them also a kick-start example, so they know what’s expected from them</a:t>
+            </a:r>
+            <a:endParaRPr lang="nl-BE" b="1" u="none" baseline="0" dirty="0" smtClean="0"/>
+          </a:p>
+          <a:p>
+            <a:pPr lvl="1">
+              <a:buFontTx/>
+              <a:buNone/>
+            </a:pPr>
+            <a:r>
+              <a:rPr lang="nl-BE" b="1" u="none" baseline="0" dirty="0" smtClean="0"/>
+              <a:t>Title:</a:t>
+            </a:r>
+            <a:r>
+              <a:rPr lang="nl-BE" b="0" u="none" baseline="0" dirty="0" smtClean="0"/>
+              <a:t> Order a snack for a user with enough credit</a:t>
+            </a:r>
+          </a:p>
+          <a:p>
+            <a:pPr lvl="1">
+              <a:buFontTx/>
+              <a:buNone/>
+            </a:pPr>
+            <a:r>
+              <a:rPr lang="nl-BE" b="1" u="none" baseline="0" dirty="0" smtClean="0"/>
+              <a:t>Given:</a:t>
+            </a:r>
+            <a:r>
+              <a:rPr lang="nl-BE" b="0" u="none" baseline="0" dirty="0" smtClean="0"/>
+              <a:t> Joe is a user with €10 credit. Pizza Hawai is a snack costing €5,3.</a:t>
+            </a:r>
+          </a:p>
+          <a:p>
+            <a:pPr lvl="1">
+              <a:buFontTx/>
+              <a:buNone/>
+            </a:pPr>
+            <a:r>
+              <a:rPr lang="nl-BE" b="1" u="none" baseline="0" dirty="0" smtClean="0"/>
+              <a:t>When:</a:t>
+            </a:r>
+            <a:r>
+              <a:rPr lang="nl-BE" b="0" u="none" baseline="0" dirty="0" smtClean="0"/>
+              <a:t> Joe orders a Pizza Hawai.</a:t>
+            </a:r>
+          </a:p>
+          <a:p>
+            <a:pPr lvl="1">
+              <a:buFontTx/>
+              <a:buNone/>
+            </a:pPr>
+            <a:r>
+              <a:rPr lang="nl-BE" b="1" u="none" baseline="0" dirty="0" smtClean="0"/>
+              <a:t>Then: </a:t>
+            </a:r>
+            <a:r>
+              <a:rPr lang="nl-BE" b="0" u="none" baseline="0" dirty="0" smtClean="0"/>
+              <a:t>His order appears on the Todays Orders list, and his credit is now €4,7. </a:t>
+            </a:r>
+            <a:endParaRPr lang="nl-BE" b="1" u="none" baseline="0" dirty="0" smtClean="0"/>
+          </a:p>
+          <a:p>
+            <a:pPr lvl="1">
+              <a:buFontTx/>
+              <a:buNone/>
+            </a:pPr>
+            <a:endParaRPr lang="nl-BE" b="0" u="none" baseline="0" dirty="0" smtClean="0"/>
+          </a:p>
+          <a:p>
+            <a:pPr marL="0" marR="0" indent="0" algn="l" defTabSz="914400" rtl="0" eaLnBrk="1" fontAlgn="auto" latinLnBrk="0" hangingPunct="1">
+              <a:lnSpc>
+                <a:spcPct val="100000"/>
+              </a:lnSpc>
+              <a:spcBef>
+                <a:spcPts val="0"/>
+              </a:spcBef>
+              <a:spcAft>
+                <a:spcPts val="0"/>
+              </a:spcAft>
+              <a:buClrTx/>
+              <a:buSzTx/>
+              <a:buFontTx/>
+              <a:buChar char="-"/>
+              <a:tabLst/>
+              <a:defRPr/>
+            </a:pPr>
+            <a:r>
+              <a:rPr lang="nl-BE" dirty="0" smtClean="0"/>
+              <a:t> Groups get </a:t>
+            </a:r>
+            <a:r>
+              <a:rPr lang="nl-BE" baseline="0" dirty="0" smtClean="0"/>
+              <a:t>A4 paper and pens to write down their real world examples.</a:t>
+            </a:r>
+          </a:p>
+          <a:p>
+            <a:pPr>
+              <a:buFontTx/>
+              <a:buChar char="-"/>
+            </a:pPr>
+            <a:endParaRPr lang="nl-BE" b="1" u="none" baseline="0" dirty="0" smtClean="0"/>
+          </a:p>
+          <a:p>
+            <a:pPr>
+              <a:buFontTx/>
+              <a:buNone/>
+            </a:pPr>
+            <a:r>
+              <a:rPr lang="nl-BE" b="0" u="sng" baseline="0" dirty="0" smtClean="0"/>
+              <a:t>Projection Screens:</a:t>
+            </a:r>
+          </a:p>
+          <a:p>
+            <a:pPr>
+              <a:buFontTx/>
+              <a:buChar char="-"/>
+            </a:pPr>
+            <a:r>
+              <a:rPr lang="nl-BE" b="0" u="none" baseline="0" dirty="0" smtClean="0"/>
+              <a:t>Pascal shows this slide</a:t>
+            </a:r>
+          </a:p>
+          <a:p>
+            <a:pPr>
+              <a:buFontTx/>
+              <a:buChar char="-"/>
+            </a:pPr>
+            <a:r>
+              <a:rPr lang="nl-BE" baseline="0" dirty="0" smtClean="0"/>
+              <a:t>Michel starts a ZoomIt countdown timer of 5minutes ( after explaination and the groups are made)</a:t>
+            </a:r>
+          </a:p>
+          <a:p>
+            <a:pPr>
+              <a:buFontTx/>
+              <a:buNone/>
+            </a:pPr>
+            <a:endParaRPr lang="nl-BE" baseline="0" dirty="0" smtClean="0"/>
+          </a:p>
+          <a:p>
+            <a:r>
+              <a:rPr lang="en-US" sz="1300" u="sng" dirty="0" smtClean="0"/>
+              <a:t>Some good questions to kick it off:</a:t>
+            </a:r>
+          </a:p>
+          <a:p>
+            <a:r>
+              <a:rPr lang="en-US" sz="1300" dirty="0" smtClean="0"/>
+              <a:t>- How do we verify that this thing we are going to write is implemented </a:t>
+            </a:r>
+            <a:r>
+              <a:rPr lang="nl-BE" sz="1300" b="1" dirty="0" smtClean="0"/>
+              <a:t>completely and correctly?</a:t>
+            </a:r>
+          </a:p>
+          <a:p>
+            <a:pPr>
+              <a:buFontTx/>
+              <a:buChar char="-"/>
+            </a:pPr>
+            <a:r>
+              <a:rPr lang="en-US" sz="1300" dirty="0" smtClean="0"/>
+              <a:t> Can you give us a few </a:t>
+            </a:r>
+            <a:r>
+              <a:rPr lang="en-US" sz="1300" b="1" dirty="0" smtClean="0"/>
+              <a:t>examples?</a:t>
+            </a:r>
+          </a:p>
+          <a:p>
+            <a:pPr>
+              <a:buFontTx/>
+              <a:buChar char="-"/>
+            </a:pPr>
+            <a:r>
+              <a:rPr lang="en-US" sz="1300" dirty="0" smtClean="0"/>
+              <a:t> Pretend it's magic and it's already delivered – </a:t>
+            </a:r>
+            <a:r>
+              <a:rPr lang="en-US" sz="1300" b="1" dirty="0" smtClean="0"/>
+              <a:t>how would you test it</a:t>
+            </a:r>
+            <a:r>
+              <a:rPr lang="en-US" sz="1300" b="1" dirty="0" smtClean="0"/>
+              <a:t>?</a:t>
+            </a:r>
           </a:p>
         </p:txBody>
       </p:sp>
@@ -937,7 +1232,7 @@
             <a:fld id="{A95F721D-B08F-41E9-83C2-423A43044BB2}" type="slidenum">
               <a:rPr lang="nl-BE" smtClean="0"/>
               <a:pPr/>
-              <a:t>13</a:t>
+              <a:t>11</a:t>
             </a:fld>
             <a:endParaRPr lang="nl-BE"/>
           </a:p>
@@ -997,132 +1292,31 @@
           </a:bodyPr>
           <a:lstStyle/>
           <a:p>
-            <a:pPr marL="0" marR="0" indent="0" algn="l" defTabSz="914400" rtl="0" eaLnBrk="1" fontAlgn="auto" latinLnBrk="0" hangingPunct="1">
-              <a:lnSpc>
-                <a:spcPct val="100000"/>
-              </a:lnSpc>
-              <a:spcBef>
-                <a:spcPts val="0"/>
-              </a:spcBef>
-              <a:spcAft>
-                <a:spcPts val="0"/>
-              </a:spcAft>
-              <a:buClrTx/>
-              <a:buSzTx/>
-              <a:buFontTx/>
-              <a:buNone/>
-              <a:tabLst/>
+            <a:pPr defTabSz="966612">
               <a:defRPr/>
             </a:pPr>
             <a:r>
-              <a:rPr lang="nl-BE" u="sng" baseline="0" dirty="0" smtClean="0"/>
-              <a:t>Second Story to manage credits:</a:t>
-            </a:r>
-          </a:p>
-          <a:p>
-            <a:pPr>
-              <a:buFontTx/>
-              <a:buChar char="-"/>
-            </a:pPr>
-            <a:r>
               <a:rPr lang="nl-BE" dirty="0" smtClean="0"/>
-              <a:t>First</a:t>
-            </a:r>
-            <a:r>
-              <a:rPr lang="nl-BE" baseline="0" dirty="0" smtClean="0"/>
-              <a:t> complete the second test for Ordering for Users with enough credit.</a:t>
-            </a:r>
-          </a:p>
-          <a:p>
-            <a:pPr lvl="1">
-              <a:buFontTx/>
-              <a:buChar char="-"/>
-            </a:pPr>
-            <a:r>
-              <a:rPr lang="nl-BE" baseline="0" dirty="0" smtClean="0"/>
-              <a:t> Get Todays orders</a:t>
-            </a:r>
-          </a:p>
-          <a:p>
-            <a:pPr lvl="1">
-              <a:buFontTx/>
-              <a:buChar char="-"/>
-            </a:pPr>
-            <a:r>
-              <a:rPr lang="nl-BE" baseline="0" dirty="0" smtClean="0"/>
-              <a:t> Check Users credit</a:t>
-            </a:r>
-          </a:p>
-          <a:p>
-            <a:pPr lvl="1">
-              <a:buFontTx/>
-              <a:buChar char="-"/>
-            </a:pPr>
-            <a:endParaRPr lang="nl-BE" baseline="0" dirty="0" smtClean="0"/>
-          </a:p>
-          <a:p>
-            <a:pPr lvl="0">
-              <a:buFontTx/>
-              <a:buChar char="-"/>
-            </a:pPr>
-            <a:r>
-              <a:rPr lang="nl-BE" baseline="0" dirty="0" smtClean="0"/>
-              <a:t>Then organize FitNesse into 3 suites</a:t>
-            </a:r>
-          </a:p>
-          <a:p>
-            <a:pPr lvl="1">
-              <a:buFontTx/>
-              <a:buChar char="-"/>
-            </a:pPr>
-            <a:r>
-              <a:rPr lang="nl-BE" baseline="0" dirty="0" smtClean="0"/>
-              <a:t>move the first test to the AcceptanceSuite.</a:t>
-            </a:r>
-          </a:p>
-          <a:p>
-            <a:pPr lvl="1">
-              <a:buFontTx/>
-              <a:buChar char="-"/>
-            </a:pPr>
-            <a:r>
-              <a:rPr lang="nl-BE" baseline="0" dirty="0" smtClean="0"/>
-              <a:t>Move the second to the WorkInProgressSuite.</a:t>
-            </a:r>
-          </a:p>
-          <a:p>
-            <a:pPr lvl="1">
-              <a:buFontTx/>
-              <a:buChar char="-"/>
-            </a:pPr>
-            <a:endParaRPr lang="nl-BE" baseline="0" dirty="0" smtClean="0"/>
-          </a:p>
-          <a:p>
-            <a:pPr lvl="0">
-              <a:buFontTx/>
-              <a:buChar char="-"/>
-            </a:pPr>
-            <a:r>
-              <a:rPr lang="nl-BE" baseline="0" dirty="0" smtClean="0"/>
-              <a:t>Implement ManageCredit User Story via Spreadsheet to Fitnesse</a:t>
-            </a:r>
-          </a:p>
-          <a:p>
-            <a:pPr lvl="0">
-              <a:buFontTx/>
-              <a:buChar char="-"/>
+              <a:t>Lets turn those examples into executable specifications to verify that we have build the right code.</a:t>
+            </a:r>
+          </a:p>
+          <a:p>
+            <a:pPr defTabSz="966612">
+              <a:defRPr/>
             </a:pPr>
             <a:endParaRPr lang="nl-BE" dirty="0" smtClean="0"/>
           </a:p>
           <a:p>
-            <a:pPr lvl="0">
-              <a:buFontTx/>
-              <a:buChar char="-"/>
+            <a:pPr defTabSz="966612">
+              <a:defRPr/>
             </a:pPr>
             <a:r>
               <a:rPr lang="nl-BE" dirty="0" smtClean="0"/>
-              <a:t>Let PO Accept. Green/Red?</a:t>
-            </a:r>
+              <a:t>Elaborate -&gt; to describe more in detail</a:t>
+            </a:r>
+          </a:p>
+          <a:p>
+            <a:endParaRPr lang="nl-BE" dirty="0"/>
           </a:p>
         </p:txBody>
       </p:sp>
@@ -1144,7 +1338,7 @@
             <a:fld id="{A95F721D-B08F-41E9-83C2-423A43044BB2}" type="slidenum">
               <a:rPr lang="nl-BE" smtClean="0"/>
               <a:pPr/>
-              <a:t>14</a:t>
+              <a:t>12</a:t>
             </a:fld>
             <a:endParaRPr lang="nl-BE"/>
           </a:p>
@@ -1200,56 +1394,109 @@
         <p:spPr/>
         <p:txBody>
           <a:bodyPr>
-            <a:normAutofit lnSpcReduction="10000"/>
+            <a:normAutofit/>
           </a:bodyPr>
           <a:lstStyle/>
           <a:p>
-            <a:r>
-              <a:rPr lang="nl-BE" u="sng" dirty="0" smtClean="0"/>
-              <a:t>Praktische zaken: </a:t>
-            </a:r>
-          </a:p>
-          <a:p>
-            <a:r>
-              <a:rPr lang="nl-BE" u="none" dirty="0" smtClean="0"/>
-              <a:t>-</a:t>
-            </a:r>
-            <a:r>
-              <a:rPr lang="nl-BE" u="none" baseline="0" dirty="0" smtClean="0"/>
-              <a:t>Vooraleer we beginnen aan deze korte workshop vragen we wie er straks mee wil coderen op zijn eigen laptop. </a:t>
-            </a:r>
-          </a:p>
-          <a:p>
-            <a:r>
-              <a:rPr lang="nl-BE" u="none" baseline="0" dirty="0" smtClean="0"/>
-              <a:t>-Deze personen vragen we hun laptop nu op te starten en de inhoud van de share te kopiëren naar hun laptop. (via GetLatest.bat)</a:t>
-            </a:r>
-          </a:p>
-          <a:p>
-            <a:r>
-              <a:rPr lang="nl-BE" u="none" baseline="0" dirty="0" smtClean="0"/>
-              <a:t>- We vermelden dat we niets installeren op de mensen hun laptops gedurende de ganse sessie (enkel xcopy deployment)</a:t>
-            </a:r>
-          </a:p>
-          <a:p>
-            <a:r>
-              <a:rPr lang="nl-BE" u="none" baseline="0" dirty="0" smtClean="0"/>
-              <a:t>	</a:t>
-            </a:r>
+            <a:pPr>
+              <a:buFontTx/>
+              <a:buNone/>
+            </a:pPr>
+            <a:r>
+              <a:rPr lang="nl-BE" u="sng" baseline="0" dirty="0" smtClean="0"/>
+              <a:t>To get started, we will implement the example we wrote on the flipchart.</a:t>
+            </a:r>
+          </a:p>
+          <a:p>
+            <a:pPr>
+              <a:buFontTx/>
+              <a:buNone/>
+            </a:pPr>
+            <a:r>
+              <a:rPr lang="nl-BE" b="1" u="none" baseline="0" dirty="0" smtClean="0"/>
+              <a:t>Title:</a:t>
+            </a:r>
+            <a:r>
+              <a:rPr lang="nl-BE" b="0" u="none" baseline="0" dirty="0" smtClean="0"/>
+              <a:t> Order a snack for a user with enough credit</a:t>
+            </a:r>
+          </a:p>
+          <a:p>
+            <a:pPr>
+              <a:buFontTx/>
+              <a:buNone/>
+            </a:pPr>
+            <a:r>
+              <a:rPr lang="nl-BE" b="1" u="none" baseline="0" dirty="0" smtClean="0"/>
+              <a:t>Given:</a:t>
+            </a:r>
+            <a:r>
+              <a:rPr lang="nl-BE" b="0" u="none" baseline="0" dirty="0" smtClean="0"/>
+              <a:t> Joe is a user with €10 credit. Pizza Hawai is a snack costing €5,3.</a:t>
+            </a:r>
+          </a:p>
+          <a:p>
+            <a:pPr>
+              <a:buFontTx/>
+              <a:buNone/>
+            </a:pPr>
+            <a:r>
+              <a:rPr lang="nl-BE" b="1" u="none" baseline="0" dirty="0" smtClean="0"/>
+              <a:t>When:</a:t>
+            </a:r>
+            <a:r>
+              <a:rPr lang="nl-BE" b="0" u="none" baseline="0" dirty="0" smtClean="0"/>
+              <a:t> Joe orders a Pizza Hawai.</a:t>
+            </a:r>
+          </a:p>
+          <a:p>
+            <a:pPr>
+              <a:buFontTx/>
+              <a:buNone/>
+            </a:pPr>
+            <a:r>
+              <a:rPr lang="nl-BE" b="1" u="none" baseline="0" dirty="0" smtClean="0"/>
+              <a:t>Then: </a:t>
+            </a:r>
+            <a:r>
+              <a:rPr lang="nl-BE" b="0" u="none" baseline="0" dirty="0" smtClean="0"/>
+              <a:t>His order appears on the Todays Orders list, and his credit is now €4,7. </a:t>
+            </a:r>
+            <a:endParaRPr lang="nl-BE" b="1" u="none" baseline="0" dirty="0" smtClean="0"/>
+          </a:p>
+          <a:p>
+            <a:pPr>
+              <a:buFontTx/>
+              <a:buNone/>
+            </a:pPr>
             <a:endParaRPr lang="nl-BE" u="sng" baseline="0" dirty="0" smtClean="0"/>
           </a:p>
           <a:p>
+            <a:pPr>
+              <a:buFontTx/>
+              <a:buNone/>
+            </a:pPr>
+            <a:r>
+              <a:rPr lang="nl-BE" baseline="0" dirty="0" smtClean="0"/>
+              <a:t>For the second example, you can propose one from your Specification Workshop, and come pair with us, to implement it.</a:t>
+            </a:r>
+          </a:p>
+          <a:p>
+            <a:pPr>
+              <a:buFontTx/>
+              <a:buNone/>
+            </a:pPr>
+            <a:endParaRPr lang="nl-BE" baseline="0" dirty="0" smtClean="0"/>
+          </a:p>
+          <a:p>
+            <a:pPr>
+              <a:buFontTx/>
+              <a:buNone/>
+            </a:pPr>
             <a:r>
               <a:rPr lang="nl-BE" u="sng" baseline="0" dirty="0" smtClean="0"/>
-              <a:t>De workshop zelf:</a:t>
-            </a:r>
-          </a:p>
-          <a:p>
-            <a:r>
-              <a:rPr lang="nl-BE" u="none" baseline="0" dirty="0" smtClean="0"/>
-              <a:t>-Verdelen van de aanwezigen in groepjes van 4. (liefst heterogeen)</a:t>
-            </a:r>
-            <a:endParaRPr lang="nl-BE" u="none" dirty="0" smtClean="0"/>
+              <a:t>Get a real world example from one of the groups (untill we run out of time):</a:t>
+            </a:r>
           </a:p>
           <a:p>
             <a:pPr>
@@ -1257,12 +1504,8 @@
               <a:buChar char="-"/>
             </a:pPr>
             <a:r>
-              <a:rPr lang="nl-BE" dirty="0" smtClean="0"/>
-              <a:t>We delen een index card van beide stories uit </a:t>
-            </a:r>
-            <a:r>
-              <a:rPr lang="nl-BE" baseline="0" dirty="0" smtClean="0"/>
-              <a:t>aan elk groepje.</a:t>
+              <a:rPr lang="nl-BE" u="none" baseline="0" dirty="0" smtClean="0"/>
+              <a:t>Who thought about ordering a snack for a user which hasn’t enough credit?</a:t>
             </a:r>
           </a:p>
           <a:p>
@@ -1271,8 +1514,12 @@
               <a:buChar char="-"/>
             </a:pPr>
             <a:r>
+              <a:rPr lang="nl-BE" dirty="0" smtClean="0"/>
+              <a:t>Write</a:t>
+            </a:r>
+            <a:r>
               <a:rPr lang="nl-BE" baseline="0" dirty="0" smtClean="0"/>
-              <a:t>We delen ook een voorbeeld uit zodanig dat de deelnemers weten wat van hun verwacht wordt.</a:t>
+              <a:t> / Clarify the example on the flip chart for the others</a:t>
             </a:r>
           </a:p>
           <a:p>
@@ -1282,7 +1529,29 @@
             </a:pPr>
             <a:r>
               <a:rPr lang="nl-BE" baseline="0" dirty="0" smtClean="0"/>
-              <a:t>Op het ene scherm laten we deze slide zien. (Pascal)</a:t>
+              <a:t>Who would like to pair up with us to implement this example?</a:t>
+            </a:r>
+            <a:endParaRPr lang="nl-BE" dirty="0" smtClean="0"/>
+          </a:p>
+          <a:p>
+            <a:pPr>
+              <a:buFontTx/>
+              <a:buNone/>
+            </a:pPr>
+            <a:endParaRPr lang="nl-BE" b="0" dirty="0" smtClean="0"/>
+          </a:p>
+          <a:p>
+            <a:pPr>
+              <a:buFontTx/>
+              <a:buNone/>
+            </a:pPr>
+            <a:r>
+              <a:rPr lang="nl-BE" b="0" u="sng" dirty="0" smtClean="0"/>
+              <a:t>At</a:t>
+            </a:r>
+            <a:r>
+              <a:rPr lang="nl-BE" b="0" u="sng" baseline="0" dirty="0" smtClean="0"/>
+              <a:t> the end of the iteration, ask the audience if they accept the second test?</a:t>
             </a:r>
           </a:p>
           <a:p>
@@ -1291,8 +1560,8 @@
               <a:buChar char="-"/>
             </a:pPr>
             <a:r>
-              <a:rPr lang="nl-BE" baseline="0" dirty="0" smtClean="0"/>
-              <a:t>Op de andere starten we de countdown timer van ZoomIt om 10 minuten wanneer de uitleg gedaan is en de groepjes gemaakt zijn. (Michel)</a:t>
+              <a:rPr lang="nl-BE" b="0" u="none" baseline="0" dirty="0" smtClean="0"/>
+              <a:t>Is the credit checked for this user?</a:t>
             </a:r>
           </a:p>
           <a:p>
@@ -1301,12 +1570,8 @@
               <a:buChar char="-"/>
             </a:pPr>
             <a:r>
-              <a:rPr lang="nl-BE" dirty="0" smtClean="0"/>
-              <a:t>De</a:t>
-            </a:r>
-            <a:r>
-              <a:rPr lang="nl-BE" baseline="0" dirty="0" smtClean="0"/>
-              <a:t> mensen krijgen A4 papier en stiften ter beschikking om hun real world voorbeelden te noteren.</a:t>
+              <a:rPr lang="nl-BE" b="0" u="none" baseline="0" dirty="0" smtClean="0"/>
+              <a:t>Is the todays orders list checked?</a:t>
             </a:r>
           </a:p>
           <a:p>
@@ -1314,52 +1579,31 @@
               <a:buFontTx/>
               <a:buChar char="-"/>
             </a:pPr>
-            <a:endParaRPr lang="nl-BE" baseline="0" dirty="0" smtClean="0"/>
-          </a:p>
-          <a:p>
-            <a:r>
-              <a:rPr lang="en-US" sz="1300" u="sng" dirty="0" smtClean="0"/>
-              <a:t>Some good questions to kick it off:</a:t>
-            </a:r>
-          </a:p>
-          <a:p>
-            <a:r>
-              <a:rPr lang="en-US" sz="1300" dirty="0" smtClean="0"/>
-              <a:t>- How do we verify that this thing we are going to write is implemented </a:t>
-            </a:r>
-            <a:r>
-              <a:rPr lang="nl-BE" sz="1300" b="1" dirty="0" smtClean="0"/>
-              <a:t>completely and correctly?</a:t>
-            </a:r>
-          </a:p>
-          <a:p>
-            <a:pPr>
-              <a:buFontTx/>
-              <a:buChar char="-"/>
-            </a:pPr>
-            <a:r>
-              <a:rPr lang="en-US" sz="1300" dirty="0" smtClean="0"/>
-              <a:t> Can you give us a few </a:t>
-            </a:r>
-            <a:r>
-              <a:rPr lang="en-US" sz="1300" b="1" dirty="0" smtClean="0"/>
-              <a:t>examples?</a:t>
-            </a:r>
-          </a:p>
-          <a:p>
-            <a:pPr>
-              <a:buFontTx/>
-              <a:buChar char="-"/>
-            </a:pPr>
-            <a:r>
-              <a:rPr lang="en-US" sz="1300" dirty="0" smtClean="0"/>
-              <a:t> Pretend it's magic and it's already delivered – </a:t>
-            </a:r>
-            <a:r>
-              <a:rPr lang="en-US" sz="1300" b="1" dirty="0" smtClean="0"/>
-              <a:t>how would you test it?</a:t>
-            </a:r>
-            <a:endParaRPr lang="nl-BE" dirty="0"/>
+            <a:endParaRPr lang="nl-BE" b="0" u="none" dirty="0" smtClean="0"/>
+          </a:p>
+          <a:p>
+            <a:r>
+              <a:rPr lang="nl-BE" u="sng" baseline="0" dirty="0" smtClean="0"/>
+              <a:t>Technical:</a:t>
+            </a:r>
+          </a:p>
+          <a:p>
+            <a:r>
+              <a:rPr lang="nl-BE" baseline="0" dirty="0" smtClean="0"/>
+              <a:t>Use SetUp to Import Namespaces.</a:t>
+            </a:r>
+          </a:p>
+          <a:p>
+            <a:r>
+              <a:rPr lang="nl-BE" baseline="0" dirty="0" smtClean="0"/>
+              <a:t>Explain DoFixture</a:t>
+            </a:r>
+          </a:p>
+          <a:p>
+            <a:r>
+              <a:rPr lang="nl-BE" baseline="0" dirty="0" smtClean="0"/>
+              <a:t>Explain ColumnFixture</a:t>
+            </a:r>
           </a:p>
         </p:txBody>
       </p:sp>
@@ -1381,7 +1625,7 @@
             <a:fld id="{A95F721D-B08F-41E9-83C2-423A43044BB2}" type="slidenum">
               <a:rPr lang="nl-BE" smtClean="0"/>
               <a:pPr/>
-              <a:t>16</a:t>
+              <a:t>13</a:t>
             </a:fld>
             <a:endParaRPr lang="nl-BE"/>
           </a:p>
@@ -1441,20 +1685,6 @@
           </a:bodyPr>
           <a:lstStyle/>
           <a:p>
-            <a:pPr lvl="1">
-              <a:buFontTx/>
-              <a:buChar char="-"/>
-            </a:pPr>
-            <a:endParaRPr lang="nl-BE" baseline="0" dirty="0" smtClean="0"/>
-          </a:p>
-          <a:p>
-            <a:pPr>
-              <a:buFontTx/>
-              <a:buChar char="-"/>
-            </a:pPr>
-            <a:endParaRPr lang="nl-BE" baseline="0" dirty="0" smtClean="0"/>
-          </a:p>
-          <a:p>
             <a:pPr marL="0" marR="0" indent="0" algn="l" defTabSz="914400" rtl="0" eaLnBrk="1" fontAlgn="auto" latinLnBrk="0" hangingPunct="1">
               <a:lnSpc>
                 <a:spcPct val="100000"/>
@@ -1468,21 +1698,15 @@
               <a:buClrTx/>
               <a:buSzTx/>
               <a:buFontTx/>
-              <a:buChar char="-"/>
+              <a:buNone/>
               <a:tabLst/>
               <a:defRPr/>
             </a:pPr>
             <a:r>
-              <a:rPr lang="nl-BE" baseline="0" dirty="0" smtClean="0"/>
-              <a:t>Add User John with credits...</a:t>
-            </a:r>
-          </a:p>
-          <a:p>
-            <a:pPr>
-              <a:buFontTx/>
-              <a:buChar char="-"/>
-            </a:pPr>
-            <a:endParaRPr lang="nl-BE" dirty="0" smtClean="0"/>
+              <a:rPr lang="nl-BE" b="1" dirty="0" smtClean="0"/>
+              <a:t>Start iteration timer: 35’</a:t>
+            </a:r>
+            <a:endParaRPr lang="nl-BE" b="1" dirty="0" smtClean="0"/>
           </a:p>
         </p:txBody>
       </p:sp>
@@ -1504,7 +1728,7 @@
             <a:fld id="{A95F721D-B08F-41E9-83C2-423A43044BB2}" type="slidenum">
               <a:rPr lang="nl-BE" smtClean="0"/>
               <a:pPr/>
-              <a:t>17</a:t>
+              <a:t>14</a:t>
             </a:fld>
             <a:endParaRPr lang="nl-BE"/>
           </a:p>
@@ -1560,28 +1784,129 @@
         <p:spPr/>
         <p:txBody>
           <a:bodyPr>
-            <a:normAutofit/>
+            <a:normAutofit lnSpcReduction="10000"/>
           </a:bodyPr>
           <a:lstStyle/>
           <a:p>
-            <a:pPr marL="0" marR="0" indent="0" algn="l" defTabSz="914400" rtl="0" eaLnBrk="1" fontAlgn="auto" latinLnBrk="0" hangingPunct="1">
-              <a:lnSpc>
-                <a:spcPct val="100000"/>
-              </a:lnSpc>
-              <a:spcBef>
-                <a:spcPts val="0"/>
-              </a:spcBef>
-              <a:spcAft>
-                <a:spcPts val="0"/>
-              </a:spcAft>
-              <a:buClrTx/>
-              <a:buSzTx/>
+            <a:r>
+              <a:rPr lang="nl-BE" u="sng" baseline="0" dirty="0" smtClean="0"/>
+              <a:t>Specification Workshop:</a:t>
+            </a:r>
+          </a:p>
+          <a:p>
+            <a:r>
+              <a:rPr lang="nl-BE" u="none" baseline="0" dirty="0" smtClean="0"/>
+              <a:t>- Same groups as 1st iteration.</a:t>
+            </a:r>
+          </a:p>
+          <a:p>
+            <a:pPr>
+              <a:buFontTx/>
+              <a:buChar char="-"/>
+            </a:pPr>
+            <a:r>
+              <a:rPr lang="nl-BE" u="none" baseline="0" dirty="0" smtClean="0"/>
+              <a:t> Hand the index card of the second user story to each group.</a:t>
+            </a:r>
+          </a:p>
+          <a:p>
+            <a:pPr>
+              <a:buFontTx/>
+              <a:buChar char="-"/>
+            </a:pPr>
+            <a:r>
+              <a:rPr lang="nl-BE" b="1" u="none" baseline="0" dirty="0" smtClean="0"/>
+              <a:t> No kick start example this time, they know the purpose.</a:t>
+            </a:r>
+          </a:p>
+          <a:p>
+            <a:pPr>
+              <a:buFontTx/>
+              <a:buChar char="-"/>
+            </a:pPr>
+            <a:endParaRPr lang="nl-BE" b="1" u="none" baseline="0" dirty="0" smtClean="0"/>
+          </a:p>
+          <a:p>
+            <a:pPr>
               <a:buFontTx/>
               <a:buNone/>
-              <a:tabLst/>
-              <a:defRPr/>
             </a:pPr>
-            <a:endParaRPr lang="nl-BE" dirty="0" smtClean="0"/>
+            <a:r>
+              <a:rPr lang="nl-BE" b="0" u="sng" baseline="0" dirty="0" smtClean="0"/>
+              <a:t>Projection Screens:</a:t>
+            </a:r>
+          </a:p>
+          <a:p>
+            <a:pPr>
+              <a:buFontTx/>
+              <a:buChar char="-"/>
+            </a:pPr>
+            <a:r>
+              <a:rPr lang="nl-BE" b="0" u="none" baseline="0" dirty="0" smtClean="0"/>
+              <a:t>Pascal shows this slide</a:t>
+            </a:r>
+          </a:p>
+          <a:p>
+            <a:pPr>
+              <a:buFontTx/>
+              <a:buChar char="-"/>
+            </a:pPr>
+            <a:r>
+              <a:rPr lang="nl-BE" baseline="0" dirty="0" smtClean="0"/>
+              <a:t>Michel starts a ZoomIt countdown timer of 5minutes ( after explaination and the groups are made)</a:t>
+            </a:r>
+          </a:p>
+          <a:p>
+            <a:pPr>
+              <a:buFontTx/>
+              <a:buNone/>
+            </a:pPr>
+            <a:endParaRPr lang="nl-BE" baseline="0" dirty="0" smtClean="0"/>
+          </a:p>
+          <a:p>
+            <a:r>
+              <a:rPr lang="en-US" sz="1300" u="sng" dirty="0" smtClean="0"/>
+              <a:t>Some good questions to kick it off:</a:t>
+            </a:r>
+          </a:p>
+          <a:p>
+            <a:r>
+              <a:rPr lang="en-US" sz="1300" dirty="0" smtClean="0"/>
+              <a:t>- How do we verify that this thing we are going to write is implemented </a:t>
+            </a:r>
+            <a:r>
+              <a:rPr lang="nl-BE" sz="1300" b="1" dirty="0" smtClean="0"/>
+              <a:t>completely and correctly?</a:t>
+            </a:r>
+          </a:p>
+          <a:p>
+            <a:pPr>
+              <a:buFontTx/>
+              <a:buChar char="-"/>
+            </a:pPr>
+            <a:r>
+              <a:rPr lang="en-US" sz="1300" dirty="0" smtClean="0"/>
+              <a:t> Can you give us a few </a:t>
+            </a:r>
+            <a:r>
+              <a:rPr lang="en-US" sz="1300" b="1" dirty="0" smtClean="0"/>
+              <a:t>examples?</a:t>
+            </a:r>
+          </a:p>
+          <a:p>
+            <a:pPr>
+              <a:buFontTx/>
+              <a:buChar char="-"/>
+            </a:pPr>
+            <a:r>
+              <a:rPr lang="en-US" sz="1300" dirty="0" smtClean="0"/>
+              <a:t> Pretend it's magic and it's already delivered – </a:t>
+            </a:r>
+            <a:r>
+              <a:rPr lang="en-US" sz="1300" b="1" dirty="0" smtClean="0"/>
+              <a:t>how would you test it?</a:t>
+            </a:r>
+            <a:endParaRPr lang="nl-BE" dirty="0"/>
           </a:p>
         </p:txBody>
       </p:sp>
@@ -1603,7 +1928,7 @@
             <a:fld id="{A95F721D-B08F-41E9-83C2-423A43044BB2}" type="slidenum">
               <a:rPr lang="nl-BE" smtClean="0"/>
               <a:pPr/>
-              <a:t>18</a:t>
+              <a:t>16</a:t>
             </a:fld>
             <a:endParaRPr lang="nl-BE"/>
           </a:p>
@@ -1663,7 +1988,232 @@
           </a:bodyPr>
           <a:lstStyle/>
           <a:p>
-            <a:endParaRPr lang="nl-BE" dirty="0"/>
+            <a:pPr marL="0" marR="0" indent="0" algn="l" defTabSz="914400" rtl="0" eaLnBrk="1" fontAlgn="auto" latinLnBrk="0" hangingPunct="1">
+              <a:lnSpc>
+                <a:spcPct val="100000"/>
+              </a:lnSpc>
+              <a:spcBef>
+                <a:spcPts val="0"/>
+              </a:spcBef>
+              <a:spcAft>
+                <a:spcPts val="0"/>
+              </a:spcAft>
+              <a:buClrTx/>
+              <a:buSzTx/>
+              <a:buFontTx/>
+              <a:buNone/>
+              <a:tabLst/>
+              <a:defRPr/>
+            </a:pPr>
+            <a:r>
+              <a:rPr lang="nl-BE" u="sng" baseline="0" dirty="0" smtClean="0"/>
+              <a:t>Optional: Finish first iteration, did the PO’s accept?:</a:t>
+            </a:r>
+          </a:p>
+          <a:p>
+            <a:pPr>
+              <a:buFontTx/>
+              <a:buChar char="-"/>
+            </a:pPr>
+            <a:r>
+              <a:rPr lang="nl-BE" dirty="0" smtClean="0"/>
+              <a:t>First</a:t>
+            </a:r>
+            <a:r>
+              <a:rPr lang="nl-BE" baseline="0" dirty="0" smtClean="0"/>
+              <a:t> complete the second test for Ordering for Users with enough credit.</a:t>
+            </a:r>
+          </a:p>
+          <a:p>
+            <a:pPr lvl="1">
+              <a:buFontTx/>
+              <a:buChar char="-"/>
+            </a:pPr>
+            <a:r>
+              <a:rPr lang="nl-BE" baseline="0" dirty="0" smtClean="0"/>
+              <a:t> Get Todays orders</a:t>
+            </a:r>
+          </a:p>
+          <a:p>
+            <a:pPr lvl="1">
+              <a:buFontTx/>
+              <a:buChar char="-"/>
+            </a:pPr>
+            <a:r>
+              <a:rPr lang="nl-BE" baseline="0" dirty="0" smtClean="0"/>
+              <a:t> Check Users credit</a:t>
+            </a:r>
+          </a:p>
+          <a:p>
+            <a:pPr lvl="0">
+              <a:buFontTx/>
+              <a:buChar char="-"/>
+            </a:pPr>
+            <a:r>
+              <a:rPr lang="nl-BE" u="none" baseline="0" dirty="0" smtClean="0"/>
+              <a:t> </a:t>
+            </a:r>
+            <a:r>
+              <a:rPr lang="nl-BE" baseline="0" dirty="0" smtClean="0"/>
+              <a:t>Then organize FitNesse into 3 suites</a:t>
+            </a:r>
+          </a:p>
+          <a:p>
+            <a:pPr lvl="1">
+              <a:buFontTx/>
+              <a:buChar char="-"/>
+            </a:pPr>
+            <a:r>
+              <a:rPr lang="nl-BE" baseline="0" dirty="0" smtClean="0"/>
+              <a:t>Move both tests after acceptance by PO to the AcceptanceSuite.</a:t>
+            </a:r>
+          </a:p>
+          <a:p>
+            <a:pPr lvl="1">
+              <a:buFontTx/>
+              <a:buChar char="-"/>
+            </a:pPr>
+            <a:r>
+              <a:rPr lang="nl-BE" baseline="0" dirty="0" smtClean="0"/>
+              <a:t>Write new tests in the WorkInProgressSuite</a:t>
+            </a:r>
+          </a:p>
+          <a:p>
+            <a:pPr marL="0" marR="0" indent="0" algn="l" defTabSz="914400" rtl="0" eaLnBrk="1" fontAlgn="auto" latinLnBrk="0" hangingPunct="1">
+              <a:lnSpc>
+                <a:spcPct val="100000"/>
+              </a:lnSpc>
+              <a:spcBef>
+                <a:spcPts val="0"/>
+              </a:spcBef>
+              <a:spcAft>
+                <a:spcPts val="0"/>
+              </a:spcAft>
+              <a:buClrTx/>
+              <a:buSzTx/>
+              <a:buFontTx/>
+              <a:buNone/>
+              <a:tabLst/>
+              <a:defRPr/>
+            </a:pPr>
+            <a:endParaRPr lang="nl-BE" u="none" baseline="0" dirty="0" smtClean="0"/>
+          </a:p>
+          <a:p>
+            <a:pPr>
+              <a:buFontTx/>
+              <a:buNone/>
+            </a:pPr>
+            <a:r>
+              <a:rPr lang="nl-BE" u="sng" baseline="0" dirty="0" smtClean="0"/>
+              <a:t>Get a real world example from one of the groups (untill we run out of time):</a:t>
+            </a:r>
+          </a:p>
+          <a:p>
+            <a:pPr>
+              <a:buFontTx/>
+              <a:buChar char="-"/>
+            </a:pPr>
+            <a:r>
+              <a:rPr lang="nl-BE" u="none" baseline="0" dirty="0" smtClean="0"/>
+              <a:t>Who thought about adding credits for a new user? / Who thought about the check that credits can’t be negative?</a:t>
+            </a:r>
+          </a:p>
+          <a:p>
+            <a:pPr>
+              <a:buFontTx/>
+              <a:buChar char="-"/>
+            </a:pPr>
+            <a:r>
+              <a:rPr lang="nl-BE" dirty="0" smtClean="0"/>
+              <a:t>Write</a:t>
+            </a:r>
+            <a:r>
+              <a:rPr lang="nl-BE" baseline="0" dirty="0" smtClean="0"/>
+              <a:t> / Clarify the example on the flip chart for the others.</a:t>
+            </a:r>
+          </a:p>
+          <a:p>
+            <a:pPr>
+              <a:buFontTx/>
+              <a:buChar char="-"/>
+            </a:pPr>
+            <a:r>
+              <a:rPr lang="nl-BE" baseline="0" dirty="0" smtClean="0"/>
+              <a:t>Who would like to pair up with us to implement this example?</a:t>
+            </a:r>
+            <a:endParaRPr lang="nl-BE" dirty="0" smtClean="0"/>
+          </a:p>
+          <a:p>
+            <a:pPr>
+              <a:buFontTx/>
+              <a:buNone/>
+            </a:pPr>
+            <a:endParaRPr lang="nl-BE" b="0" dirty="0" smtClean="0"/>
+          </a:p>
+          <a:p>
+            <a:r>
+              <a:rPr lang="nl-BE" u="sng" baseline="0" dirty="0" smtClean="0"/>
+              <a:t>Technical:</a:t>
+            </a:r>
+          </a:p>
+          <a:p>
+            <a:r>
+              <a:rPr lang="nl-BE" u="none" baseline="0" dirty="0" smtClean="0"/>
+              <a:t>Show debugging options: Fitnesse.WaitASecond, GFlags</a:t>
+            </a:r>
+          </a:p>
+          <a:p>
+            <a:pPr marL="0" marR="0" indent="0" algn="l" defTabSz="914400" rtl="0" eaLnBrk="1" fontAlgn="auto" latinLnBrk="0" hangingPunct="1">
+              <a:lnSpc>
+                <a:spcPct val="100000"/>
+              </a:lnSpc>
+              <a:spcBef>
+                <a:spcPts val="0"/>
+              </a:spcBef>
+              <a:spcAft>
+                <a:spcPts val="0"/>
+              </a:spcAft>
+              <a:buClrTx/>
+              <a:buSzTx/>
+              <a:buFontTx/>
+              <a:buNone/>
+              <a:tabLst/>
+              <a:defRPr/>
+            </a:pPr>
+            <a:r>
+              <a:rPr lang="nl-BE" baseline="0" dirty="0" smtClean="0"/>
+              <a:t>Explain ColumnFixture</a:t>
+            </a:r>
+            <a:endParaRPr lang="nl-BE" u="sng" baseline="0" dirty="0" smtClean="0"/>
+          </a:p>
+          <a:p>
+            <a:pPr marL="0" marR="0" indent="0" algn="l" defTabSz="914400" rtl="0" eaLnBrk="1" fontAlgn="auto" latinLnBrk="0" hangingPunct="1">
+              <a:lnSpc>
+                <a:spcPct val="100000"/>
+              </a:lnSpc>
+              <a:spcBef>
+                <a:spcPts val="0"/>
+              </a:spcBef>
+              <a:spcAft>
+                <a:spcPts val="0"/>
+              </a:spcAft>
+              <a:buClrTx/>
+              <a:buSzTx/>
+              <a:buFontTx/>
+              <a:buNone/>
+              <a:tabLst/>
+              <a:defRPr/>
+            </a:pPr>
+            <a:r>
+              <a:rPr lang="nl-BE" baseline="0" dirty="0" smtClean="0"/>
+              <a:t>Explain RowFixture</a:t>
+            </a:r>
+          </a:p>
+          <a:p>
+            <a:r>
+              <a:rPr lang="nl-BE" baseline="0" dirty="0" smtClean="0"/>
+              <a:t>Explain DoFixture</a:t>
+            </a:r>
           </a:p>
         </p:txBody>
       </p:sp>
@@ -1685,7 +2235,7 @@
             <a:fld id="{A95F721D-B08F-41E9-83C2-423A43044BB2}" type="slidenum">
               <a:rPr lang="nl-BE" smtClean="0"/>
               <a:pPr/>
-              <a:t>19</a:t>
+              <a:t>17</a:t>
             </a:fld>
             <a:endParaRPr lang="nl-BE"/>
           </a:p>
@@ -1745,7 +2295,24 @@
           </a:bodyPr>
           <a:lstStyle/>
           <a:p>
-            <a:endParaRPr lang="nl-BE" dirty="0"/>
+            <a:pPr marL="0" marR="0" indent="0" algn="l" defTabSz="914400" rtl="0" eaLnBrk="1" fontAlgn="auto" latinLnBrk="0" hangingPunct="1">
+              <a:lnSpc>
+                <a:spcPct val="100000"/>
+              </a:lnSpc>
+              <a:spcBef>
+                <a:spcPts val="0"/>
+              </a:spcBef>
+              <a:spcAft>
+                <a:spcPts val="0"/>
+              </a:spcAft>
+              <a:buClrTx/>
+              <a:buSzTx/>
+              <a:buFontTx/>
+              <a:buNone/>
+              <a:tabLst/>
+              <a:defRPr/>
+            </a:pPr>
+            <a:endParaRPr lang="nl-BE" dirty="0" smtClean="0"/>
           </a:p>
         </p:txBody>
       </p:sp>
@@ -1767,7 +2334,7 @@
             <a:fld id="{A95F721D-B08F-41E9-83C2-423A43044BB2}" type="slidenum">
               <a:rPr lang="nl-BE" smtClean="0"/>
               <a:pPr/>
-              <a:t>20</a:t>
+              <a:t>18</a:t>
             </a:fld>
             <a:endParaRPr lang="nl-BE"/>
           </a:p>
@@ -1849,7 +2416,7 @@
             <a:fld id="{A95F721D-B08F-41E9-83C2-423A43044BB2}" type="slidenum">
               <a:rPr lang="nl-BE" smtClean="0"/>
               <a:pPr/>
-              <a:t>21</a:t>
+              <a:t>19</a:t>
             </a:fld>
             <a:endParaRPr lang="nl-BE"/>
           </a:p>
@@ -1909,10 +2476,6 @@
           </a:bodyPr>
           <a:lstStyle/>
           <a:p>
-            <a:pPr>
-              <a:buFontTx/>
-              <a:buNone/>
-            </a:pPr>
             <a:endParaRPr lang="nl-BE" dirty="0"/>
           </a:p>
         </p:txBody>
@@ -1935,7 +2498,7 @@
             <a:fld id="{A95F721D-B08F-41E9-83C2-423A43044BB2}" type="slidenum">
               <a:rPr lang="nl-BE" smtClean="0"/>
               <a:pPr/>
-              <a:t>22</a:t>
+              <a:t>20</a:t>
             </a:fld>
             <a:endParaRPr lang="nl-BE"/>
           </a:p>
@@ -1997,13 +2560,110 @@
           <a:p>
             <a:r>
               <a:rPr lang="nl-BE" dirty="0" smtClean="0"/>
-              <a:t>Timeframe: 90 mins</a:t>
-            </a:r>
-          </a:p>
-          <a:p>
+              <a:t>Hand-out </a:t>
+            </a:r>
             <a:r>
               <a:rPr lang="nl-BE" dirty="0" smtClean="0"/>
-              <a:t>Don’t mind the ringing of the Pomodoro Timer. It’s there to help us keep our timings.</a:t>
+              <a:t>this as a reference A5 @ the end of the session</a:t>
+            </a:r>
+            <a:r>
+              <a:rPr lang="nl-BE" dirty="0" smtClean="0"/>
+              <a:t>.</a:t>
+            </a:r>
+          </a:p>
+          <a:p>
+            <a:endParaRPr lang="nl-BE" dirty="0" smtClean="0"/>
+          </a:p>
+          <a:p>
+            <a:pPr marL="0" marR="0" indent="0" algn="l" defTabSz="914400" rtl="0" eaLnBrk="1" fontAlgn="auto" latinLnBrk="0" hangingPunct="1">
+              <a:lnSpc>
+                <a:spcPct val="100000"/>
+              </a:lnSpc>
+              <a:spcBef>
+                <a:spcPts val="0"/>
+              </a:spcBef>
+              <a:spcAft>
+                <a:spcPts val="0"/>
+              </a:spcAft>
+              <a:buClrTx/>
+              <a:buSzTx/>
+              <a:buFontTx/>
+              <a:buNone/>
+              <a:tabLst/>
+              <a:defRPr/>
+            </a:pPr>
+            <a:r>
+              <a:rPr lang="nl-BE" dirty="0" smtClean="0"/>
+              <a:t>Introduce ourselves &amp; our firms.</a:t>
+            </a:r>
+          </a:p>
+          <a:p>
+            <a:endParaRPr lang="nl-BE" dirty="0" smtClean="0"/>
+          </a:p>
+          <a:p>
+            <a:r>
+              <a:rPr lang="nl-BE" b="1" u="sng" dirty="0" smtClean="0"/>
+              <a:t>Ihc Group:</a:t>
+            </a:r>
+            <a:endParaRPr lang="nl-BE" b="1" u="sng" baseline="0" dirty="0" smtClean="0"/>
+          </a:p>
+          <a:p>
+            <a:r>
+              <a:rPr lang="nl-BE" baseline="0" dirty="0" smtClean="0"/>
+              <a:t>The Ihc Group is delivering ICT solutions for more than 60 Belgian Hospitals. At time of speaking, we run 7 agile teams and have about 3 years experience in Agile Software Development.</a:t>
+            </a:r>
+          </a:p>
+          <a:p>
+            <a:endParaRPr lang="nl-BE" dirty="0" smtClean="0"/>
+          </a:p>
+          <a:p>
+            <a:r>
+              <a:rPr lang="nl-BE" b="1" u="sng" dirty="0" smtClean="0"/>
+              <a:t>Pascal: Solution</a:t>
+            </a:r>
+            <a:r>
+              <a:rPr lang="nl-BE" b="1" u="sng" baseline="0" dirty="0" smtClean="0"/>
+              <a:t> Architect</a:t>
+            </a:r>
+          </a:p>
+          <a:p>
+            <a:pPr>
+              <a:buFontTx/>
+              <a:buChar char="-"/>
+            </a:pPr>
+            <a:r>
+              <a:rPr lang="nl-BE" baseline="0" dirty="0" smtClean="0"/>
+              <a:t>Participating in our agile teams helping to deliver business value for our customers</a:t>
+            </a:r>
+          </a:p>
+          <a:p>
+            <a:pPr>
+              <a:buFontTx/>
+              <a:buChar char="-"/>
+            </a:pPr>
+            <a:r>
+              <a:rPr lang="nl-BE" baseline="0" dirty="0" smtClean="0"/>
+              <a:t>Evangelizing Agile practices</a:t>
+            </a:r>
+          </a:p>
+          <a:p>
+            <a:pPr>
+              <a:buFontTx/>
+              <a:buChar char="-"/>
+            </a:pPr>
+            <a:r>
+              <a:rPr lang="nl-BE" baseline="0" dirty="0" smtClean="0"/>
+              <a:t>Communicating the architecture, tools, standards and design principles to be used</a:t>
+            </a:r>
+          </a:p>
+          <a:p>
+            <a:pPr>
+              <a:buFontTx/>
+              <a:buChar char="-"/>
+            </a:pPr>
+            <a:r>
+              <a:rPr lang="nl-BE" baseline="0" dirty="0" smtClean="0"/>
+              <a:t>Work in Micosoft.Net environment since its inception in 2002</a:t>
             </a:r>
             <a:endParaRPr lang="nl-BE" dirty="0"/>
           </a:p>
@@ -2027,7 +2687,7 @@
             <a:fld id="{A95F721D-B08F-41E9-83C2-423A43044BB2}" type="slidenum">
               <a:rPr lang="nl-BE" smtClean="0"/>
               <a:pPr/>
-              <a:t>3</a:t>
+              <a:t>2</a:t>
             </a:fld>
             <a:endParaRPr lang="nl-BE"/>
           </a:p>
@@ -2087,75 +2747,7 @@
           </a:bodyPr>
           <a:lstStyle/>
           <a:p>
-            <a:pPr>
-              <a:buFontTx/>
-              <a:buChar char="-"/>
-            </a:pPr>
-            <a:r>
-              <a:rPr lang="nl-BE" dirty="0" smtClean="0"/>
-              <a:t>Rode</a:t>
-            </a:r>
-            <a:r>
-              <a:rPr lang="nl-BE" baseline="0" dirty="0" smtClean="0"/>
-              <a:t> testen toevoegen aan groenen</a:t>
-            </a:r>
-          </a:p>
-          <a:p>
-            <a:pPr>
-              <a:buFontTx/>
-              <a:buChar char="-"/>
-            </a:pPr>
-            <a:r>
-              <a:rPr lang="nl-BE" baseline="0" dirty="0" smtClean="0"/>
-              <a:t>Groenen zijn geaccepteerd – alarm! Awereness!</a:t>
-            </a:r>
-          </a:p>
-          <a:p>
-            <a:pPr>
-              <a:buFontTx/>
-              <a:buChar char="-"/>
-            </a:pPr>
-            <a:r>
-              <a:rPr lang="nl-BE" baseline="0" dirty="0" smtClean="0"/>
-              <a:t>Build should fail by regression tests, not by Work In Progress.</a:t>
-            </a:r>
-          </a:p>
-          <a:p>
-            <a:pPr>
-              <a:buFontTx/>
-              <a:buChar char="-"/>
-            </a:pPr>
-            <a:endParaRPr lang="nl-BE" baseline="0" dirty="0" smtClean="0"/>
-          </a:p>
-          <a:p>
-            <a:pPr>
-              <a:buFontTx/>
-              <a:buChar char="-"/>
-            </a:pPr>
-            <a:r>
-              <a:rPr lang="nl-BE" b="1" u="sng" baseline="0" dirty="0" smtClean="0"/>
-              <a:t>Ask the Audience:</a:t>
-            </a:r>
-          </a:p>
-          <a:p>
-            <a:pPr>
-              <a:buFontTx/>
-              <a:buChar char="-"/>
-            </a:pPr>
-            <a:r>
-              <a:rPr lang="nl-BE" baseline="0" dirty="0" smtClean="0"/>
-              <a:t>Should we demo build integration? </a:t>
-            </a:r>
-          </a:p>
-          <a:p>
-            <a:pPr lvl="0">
-              <a:buFontTx/>
-              <a:buChar char="-"/>
-            </a:pPr>
-            <a:r>
-              <a:rPr lang="nl-BE" dirty="0" smtClean="0"/>
-              <a:t>Demo debugging with TestDriven.Net?</a:t>
-            </a:r>
+            <a:endParaRPr lang="nl-BE" dirty="0"/>
           </a:p>
         </p:txBody>
       </p:sp>
@@ -2177,7 +2769,7 @@
             <a:fld id="{A95F721D-B08F-41E9-83C2-423A43044BB2}" type="slidenum">
               <a:rPr lang="nl-BE" smtClean="0"/>
               <a:pPr/>
-              <a:t>25</a:t>
+              <a:t>21</a:t>
             </a:fld>
             <a:endParaRPr lang="nl-BE"/>
           </a:p>
@@ -2237,48 +2829,11 @@
           </a:bodyPr>
           <a:lstStyle/>
           <a:p>
-            <a:pPr lvl="1">
-              <a:buFontTx/>
-              <a:buChar char="-"/>
-            </a:pPr>
-            <a:endParaRPr lang="nl-BE" baseline="0" dirty="0" smtClean="0"/>
-          </a:p>
-          <a:p>
             <a:pPr>
               <a:buFontTx/>
-              <a:buChar char="-"/>
+              <a:buNone/>
             </a:pPr>
-            <a:endParaRPr lang="nl-BE" baseline="0" dirty="0" smtClean="0"/>
-          </a:p>
-          <a:p>
-            <a:pPr marL="0" marR="0" indent="0" algn="l" defTabSz="914400" rtl="0" eaLnBrk="1" fontAlgn="auto" latinLnBrk="0" hangingPunct="1">
-              <a:lnSpc>
-                <a:spcPct val="100000"/>
-              </a:lnSpc>
-              <a:spcBef>
-                <a:spcPts val="0"/>
-              </a:spcBef>
-              <a:spcAft>
-                <a:spcPts val="0"/>
-              </a:spcAft>
-              <a:buClrTx/>
-              <a:buSzTx/>
-              <a:buFontTx/>
-              <a:buChar char="-"/>
-              <a:tabLst/>
-              <a:defRPr/>
-            </a:pPr>
-            <a:r>
-              <a:rPr lang="nl-BE" baseline="0" dirty="0" smtClean="0"/>
-              <a:t>Add User John with credits...</a:t>
-            </a:r>
-          </a:p>
-          <a:p>
-            <a:pPr>
-              <a:buFontTx/>
-              <a:buChar char="-"/>
-            </a:pPr>
-            <a:endParaRPr lang="nl-BE" dirty="0" smtClean="0"/>
+            <a:endParaRPr lang="nl-BE" dirty="0"/>
           </a:p>
         </p:txBody>
       </p:sp>
@@ -2300,7 +2855,7 @@
             <a:fld id="{A95F721D-B08F-41E9-83C2-423A43044BB2}" type="slidenum">
               <a:rPr lang="nl-BE" smtClean="0"/>
               <a:pPr/>
-              <a:t>26</a:t>
+              <a:t>22</a:t>
             </a:fld>
             <a:endParaRPr lang="nl-BE"/>
           </a:p>
@@ -2360,25 +2915,29 @@
           </a:bodyPr>
           <a:lstStyle/>
           <a:p>
-            <a:pPr lvl="1">
-              <a:buFontTx/>
-              <a:buChar char="-"/>
-            </a:pPr>
-            <a:endParaRPr lang="nl-BE" baseline="0" dirty="0" smtClean="0"/>
-          </a:p>
-          <a:p>
-            <a:pPr>
-              <a:buFontTx/>
-              <a:buChar char="-"/>
-            </a:pPr>
-            <a:endParaRPr lang="nl-BE" baseline="0" dirty="0" smtClean="0"/>
-          </a:p>
-          <a:p>
-            <a:pPr>
-              <a:buFontTx/>
-              <a:buChar char="-"/>
-            </a:pPr>
-            <a:endParaRPr lang="nl-BE" dirty="0" smtClean="0"/>
+            <a:r>
+              <a:rPr lang="nl-BE" dirty="0" smtClean="0"/>
+              <a:t>Download this slidedeck also from google code, url</a:t>
+            </a:r>
+            <a:r>
+              <a:rPr lang="nl-BE" baseline="0" dirty="0" smtClean="0"/>
+              <a:t> is on </a:t>
+            </a:r>
+            <a:r>
+              <a:rPr lang="nl-BE" dirty="0" smtClean="0"/>
+              <a:t>the hand-outs.</a:t>
+            </a:r>
+          </a:p>
+          <a:p>
+            <a:r>
+              <a:rPr lang="nl-BE" dirty="0" smtClean="0"/>
+              <a:t>If</a:t>
+            </a:r>
+            <a:r>
+              <a:rPr lang="nl-BE" baseline="0" dirty="0" smtClean="0"/>
+              <a:t> you have any questions, our e-mail addresses are on the hand-outs to.</a:t>
+            </a:r>
+            <a:endParaRPr lang="nl-BE" dirty="0"/>
           </a:p>
         </p:txBody>
       </p:sp>
@@ -2400,7 +2959,7 @@
             <a:fld id="{A95F721D-B08F-41E9-83C2-423A43044BB2}" type="slidenum">
               <a:rPr lang="nl-BE" smtClean="0"/>
               <a:pPr/>
-              <a:t>27</a:t>
+              <a:t>23</a:t>
             </a:fld>
             <a:endParaRPr lang="nl-BE"/>
           </a:p>
@@ -2460,25 +3019,15 @@
           </a:bodyPr>
           <a:lstStyle/>
           <a:p>
-            <a:pPr lvl="1">
-              <a:buFontTx/>
-              <a:buChar char="-"/>
-            </a:pPr>
-            <a:endParaRPr lang="nl-BE" baseline="0" dirty="0" smtClean="0"/>
-          </a:p>
-          <a:p>
-            <a:pPr>
-              <a:buFontTx/>
-              <a:buChar char="-"/>
-            </a:pPr>
-            <a:endParaRPr lang="nl-BE" baseline="0" dirty="0" smtClean="0"/>
-          </a:p>
-          <a:p>
-            <a:pPr>
-              <a:buFontTx/>
-              <a:buChar char="-"/>
-            </a:pPr>
-            <a:endParaRPr lang="nl-BE" dirty="0" smtClean="0"/>
+            <a:r>
+              <a:rPr lang="nl-BE" dirty="0" smtClean="0"/>
+              <a:t>Let participants fill in the Retrospective Cards from Xpdays</a:t>
+            </a:r>
+            <a:r>
+              <a:rPr lang="nl-BE" baseline="0" dirty="0" smtClean="0"/>
+              <a:t>.</a:t>
+            </a:r>
+            <a:endParaRPr lang="nl-BE" dirty="0"/>
           </a:p>
         </p:txBody>
       </p:sp>
@@ -2500,7 +3049,7 @@
             <a:fld id="{A95F721D-B08F-41E9-83C2-423A43044BB2}" type="slidenum">
               <a:rPr lang="nl-BE" smtClean="0"/>
               <a:pPr/>
-              <a:t>28</a:t>
+              <a:t>24</a:t>
             </a:fld>
             <a:endParaRPr lang="nl-BE"/>
           </a:p>
@@ -2560,6 +3109,468 @@
           </a:bodyPr>
           <a:lstStyle/>
           <a:p>
+            <a:pPr>
+              <a:buFontTx/>
+              <a:buChar char="-"/>
+            </a:pPr>
+            <a:r>
+              <a:rPr lang="nl-BE" dirty="0" smtClean="0"/>
+              <a:t>Failing tests added to accepted ones. A</a:t>
+            </a:r>
+            <a:r>
+              <a:rPr lang="nl-BE" baseline="0" dirty="0" smtClean="0"/>
+              <a:t>larm</a:t>
+            </a:r>
+            <a:r>
+              <a:rPr lang="nl-BE" baseline="0" dirty="0" smtClean="0"/>
+              <a:t>! Awereness!</a:t>
+            </a:r>
+          </a:p>
+          <a:p>
+            <a:pPr>
+              <a:buFontTx/>
+              <a:buChar char="-"/>
+            </a:pPr>
+            <a:r>
+              <a:rPr lang="nl-BE" baseline="0" dirty="0" smtClean="0"/>
+              <a:t>Build should fail by regression tests, not by Work In Progress.</a:t>
+            </a:r>
+          </a:p>
+          <a:p>
+            <a:pPr>
+              <a:buFontTx/>
+              <a:buChar char="-"/>
+            </a:pPr>
+            <a:endParaRPr lang="nl-BE" baseline="0" dirty="0" smtClean="0"/>
+          </a:p>
+          <a:p>
+            <a:pPr>
+              <a:buFontTx/>
+              <a:buChar char="-"/>
+            </a:pPr>
+            <a:r>
+              <a:rPr lang="nl-BE" b="1" u="sng" baseline="0" dirty="0" smtClean="0"/>
+              <a:t>Ask the Audience:</a:t>
+            </a:r>
+          </a:p>
+          <a:p>
+            <a:pPr>
+              <a:buFontTx/>
+              <a:buChar char="-"/>
+            </a:pPr>
+            <a:r>
+              <a:rPr lang="nl-BE" baseline="0" dirty="0" smtClean="0"/>
+              <a:t>Should we demo build integration</a:t>
+            </a:r>
+            <a:r>
+              <a:rPr lang="nl-BE" baseline="0" dirty="0" smtClean="0"/>
+              <a:t>?</a:t>
+            </a:r>
+            <a:endParaRPr lang="nl-BE" baseline="0" dirty="0" smtClean="0"/>
+          </a:p>
+        </p:txBody>
+      </p:sp>
+      <p:sp>
+        <p:nvSpPr>
+          <p:cNvPr id="4" name="Slide Number Placeholder 3"/>
+          <p:cNvSpPr>
+            <a:spLocks noGrp="1"/>
+          </p:cNvSpPr>
+          <p:nvPr>
+            <p:ph type="sldNum" sz="quarter" idx="10"/>
+          </p:nvPr>
+        </p:nvSpPr>
+        <p:spPr/>
+        <p:txBody>
+          <a:bodyPr/>
+          <a:lstStyle/>
+          <a:p>
+            <a:fld id="{A95F721D-B08F-41E9-83C2-423A43044BB2}" type="slidenum">
+              <a:rPr lang="nl-BE" smtClean="0"/>
+              <a:pPr/>
+              <a:t>25</a:t>
+            </a:fld>
+            <a:endParaRPr lang="nl-BE"/>
+          </a:p>
+        </p:txBody>
+      </p:sp>
+    </p:spTree>
+  </p:cSld>
+  <p:clrMapOvr>
+    <a:masterClrMapping/>
+  </p:clrMapOvr>
+</p:notes>
+</file>
+
+<file path=ppt/notesSlides/notesSlide25.xml><?xml version="1.0" encoding="utf-8"?>
+<p:notes xmlns:a="http://schemas.openxmlformats.org/drawingml/2006/main" xmlns:r="http://schemas.openxmlformats.org/officeDocument/2006/relationships" xmlns:p="http://schemas.openxmlformats.org/presentationml/2006/main">
+  <p:cSld>
+    <p:spTree>
+      <p:nvGrpSpPr>
+        <p:cNvPr id="1" name=""/>
+        <p:cNvGrpSpPr/>
+        <p:nvPr/>
+      </p:nvGrpSpPr>
+      <p:grpSpPr>
+        <a:xfrm>
+          <a:off x="0" y="0"/>
+          <a:ext cx="0" cy="0"/>
+          <a:chOff x="0" y="0"/>
+          <a:chExt cx="0" cy="0"/>
+        </a:xfrm>
+      </p:grpSpPr>
+      <p:sp>
+        <p:nvSpPr>
+          <p:cNvPr id="2" name="Slide Image Placeholder 1"/>
+          <p:cNvSpPr>
+            <a:spLocks noGrp="1" noRot="1" noChangeAspect="1"/>
+          </p:cNvSpPr>
+          <p:nvPr>
+            <p:ph type="sldImg"/>
+          </p:nvPr>
+        </p:nvSpPr>
+        <p:spPr/>
+      </p:sp>
+      <p:sp>
+        <p:nvSpPr>
+          <p:cNvPr id="3" name="Notes Placeholder 2"/>
+          <p:cNvSpPr>
+            <a:spLocks noGrp="1"/>
+          </p:cNvSpPr>
+          <p:nvPr>
+            <p:ph type="body" idx="1"/>
+          </p:nvPr>
+        </p:nvSpPr>
+        <p:spPr/>
+        <p:txBody>
+          <a:bodyPr>
+            <a:normAutofit/>
+          </a:bodyPr>
+          <a:lstStyle/>
+          <a:p>
+            <a:pPr lvl="1">
+              <a:buFontTx/>
+              <a:buChar char="-"/>
+            </a:pPr>
+            <a:endParaRPr lang="nl-BE" baseline="0" dirty="0" smtClean="0"/>
+          </a:p>
+          <a:p>
+            <a:pPr>
+              <a:buFontTx/>
+              <a:buChar char="-"/>
+            </a:pPr>
+            <a:endParaRPr lang="nl-BE" baseline="0" dirty="0" smtClean="0"/>
+          </a:p>
+          <a:p>
+            <a:pPr marL="0" marR="0" indent="0" algn="l" defTabSz="914400" rtl="0" eaLnBrk="1" fontAlgn="auto" latinLnBrk="0" hangingPunct="1">
+              <a:lnSpc>
+                <a:spcPct val="100000"/>
+              </a:lnSpc>
+              <a:spcBef>
+                <a:spcPts val="0"/>
+              </a:spcBef>
+              <a:spcAft>
+                <a:spcPts val="0"/>
+              </a:spcAft>
+              <a:buClrTx/>
+              <a:buSzTx/>
+              <a:buFontTx/>
+              <a:buChar char="-"/>
+              <a:tabLst/>
+              <a:defRPr/>
+            </a:pPr>
+            <a:r>
+              <a:rPr lang="nl-BE" baseline="0" dirty="0" smtClean="0"/>
+              <a:t>Add User John with credits...</a:t>
+            </a:r>
+          </a:p>
+          <a:p>
+            <a:pPr>
+              <a:buFontTx/>
+              <a:buChar char="-"/>
+            </a:pPr>
+            <a:endParaRPr lang="nl-BE" dirty="0" smtClean="0"/>
+          </a:p>
+        </p:txBody>
+      </p:sp>
+      <p:sp>
+        <p:nvSpPr>
+          <p:cNvPr id="4" name="Slide Number Placeholder 3"/>
+          <p:cNvSpPr>
+            <a:spLocks noGrp="1"/>
+          </p:cNvSpPr>
+          <p:nvPr>
+            <p:ph type="sldNum" sz="quarter" idx="10"/>
+          </p:nvPr>
+        </p:nvSpPr>
+        <p:spPr/>
+        <p:txBody>
+          <a:bodyPr/>
+          <a:lstStyle/>
+          <a:p>
+            <a:fld id="{A95F721D-B08F-41E9-83C2-423A43044BB2}" type="slidenum">
+              <a:rPr lang="nl-BE" smtClean="0"/>
+              <a:pPr/>
+              <a:t>26</a:t>
+            </a:fld>
+            <a:endParaRPr lang="nl-BE"/>
+          </a:p>
+        </p:txBody>
+      </p:sp>
+    </p:spTree>
+  </p:cSld>
+  <p:clrMapOvr>
+    <a:masterClrMapping/>
+  </p:clrMapOvr>
+</p:notes>
+</file>
+
+<file path=ppt/notesSlides/notesSlide26.xml><?xml version="1.0" encoding="utf-8"?>
+<p:notes xmlns:a="http://schemas.openxmlformats.org/drawingml/2006/main" xmlns:r="http://schemas.openxmlformats.org/officeDocument/2006/relationships" xmlns:p="http://schemas.openxmlformats.org/presentationml/2006/main">
+  <p:cSld>
+    <p:spTree>
+      <p:nvGrpSpPr>
+        <p:cNvPr id="1" name=""/>
+        <p:cNvGrpSpPr/>
+        <p:nvPr/>
+      </p:nvGrpSpPr>
+      <p:grpSpPr>
+        <a:xfrm>
+          <a:off x="0" y="0"/>
+          <a:ext cx="0" cy="0"/>
+          <a:chOff x="0" y="0"/>
+          <a:chExt cx="0" cy="0"/>
+        </a:xfrm>
+      </p:grpSpPr>
+      <p:sp>
+        <p:nvSpPr>
+          <p:cNvPr id="2" name="Slide Image Placeholder 1"/>
+          <p:cNvSpPr>
+            <a:spLocks noGrp="1" noRot="1" noChangeAspect="1"/>
+          </p:cNvSpPr>
+          <p:nvPr>
+            <p:ph type="sldImg"/>
+          </p:nvPr>
+        </p:nvSpPr>
+        <p:spPr/>
+      </p:sp>
+      <p:sp>
+        <p:nvSpPr>
+          <p:cNvPr id="3" name="Notes Placeholder 2"/>
+          <p:cNvSpPr>
+            <a:spLocks noGrp="1"/>
+          </p:cNvSpPr>
+          <p:nvPr>
+            <p:ph type="body" idx="1"/>
+          </p:nvPr>
+        </p:nvSpPr>
+        <p:spPr/>
+        <p:txBody>
+          <a:bodyPr>
+            <a:normAutofit/>
+          </a:bodyPr>
+          <a:lstStyle/>
+          <a:p>
+            <a:pPr lvl="1">
+              <a:buFontTx/>
+              <a:buChar char="-"/>
+            </a:pPr>
+            <a:endParaRPr lang="nl-BE" baseline="0" dirty="0" smtClean="0"/>
+          </a:p>
+          <a:p>
+            <a:pPr>
+              <a:buFontTx/>
+              <a:buChar char="-"/>
+            </a:pPr>
+            <a:endParaRPr lang="nl-BE" baseline="0" dirty="0" smtClean="0"/>
+          </a:p>
+          <a:p>
+            <a:pPr>
+              <a:buFontTx/>
+              <a:buChar char="-"/>
+            </a:pPr>
+            <a:endParaRPr lang="nl-BE" dirty="0" smtClean="0"/>
+          </a:p>
+        </p:txBody>
+      </p:sp>
+      <p:sp>
+        <p:nvSpPr>
+          <p:cNvPr id="4" name="Slide Number Placeholder 3"/>
+          <p:cNvSpPr>
+            <a:spLocks noGrp="1"/>
+          </p:cNvSpPr>
+          <p:nvPr>
+            <p:ph type="sldNum" sz="quarter" idx="10"/>
+          </p:nvPr>
+        </p:nvSpPr>
+        <p:spPr/>
+        <p:txBody>
+          <a:bodyPr/>
+          <a:lstStyle/>
+          <a:p>
+            <a:fld id="{A95F721D-B08F-41E9-83C2-423A43044BB2}" type="slidenum">
+              <a:rPr lang="nl-BE" smtClean="0"/>
+              <a:pPr/>
+              <a:t>27</a:t>
+            </a:fld>
+            <a:endParaRPr lang="nl-BE"/>
+          </a:p>
+        </p:txBody>
+      </p:sp>
+    </p:spTree>
+  </p:cSld>
+  <p:clrMapOvr>
+    <a:masterClrMapping/>
+  </p:clrMapOvr>
+</p:notes>
+</file>
+
+<file path=ppt/notesSlides/notesSlide27.xml><?xml version="1.0" encoding="utf-8"?>
+<p:notes xmlns:a="http://schemas.openxmlformats.org/drawingml/2006/main" xmlns:r="http://schemas.openxmlformats.org/officeDocument/2006/relationships" xmlns:p="http://schemas.openxmlformats.org/presentationml/2006/main">
+  <p:cSld>
+    <p:spTree>
+      <p:nvGrpSpPr>
+        <p:cNvPr id="1" name=""/>
+        <p:cNvGrpSpPr/>
+        <p:nvPr/>
+      </p:nvGrpSpPr>
+      <p:grpSpPr>
+        <a:xfrm>
+          <a:off x="0" y="0"/>
+          <a:ext cx="0" cy="0"/>
+          <a:chOff x="0" y="0"/>
+          <a:chExt cx="0" cy="0"/>
+        </a:xfrm>
+      </p:grpSpPr>
+      <p:sp>
+        <p:nvSpPr>
+          <p:cNvPr id="2" name="Slide Image Placeholder 1"/>
+          <p:cNvSpPr>
+            <a:spLocks noGrp="1" noRot="1" noChangeAspect="1"/>
+          </p:cNvSpPr>
+          <p:nvPr>
+            <p:ph type="sldImg"/>
+          </p:nvPr>
+        </p:nvSpPr>
+        <p:spPr/>
+      </p:sp>
+      <p:sp>
+        <p:nvSpPr>
+          <p:cNvPr id="3" name="Notes Placeholder 2"/>
+          <p:cNvSpPr>
+            <a:spLocks noGrp="1"/>
+          </p:cNvSpPr>
+          <p:nvPr>
+            <p:ph type="body" idx="1"/>
+          </p:nvPr>
+        </p:nvSpPr>
+        <p:spPr/>
+        <p:txBody>
+          <a:bodyPr>
+            <a:normAutofit/>
+          </a:bodyPr>
+          <a:lstStyle/>
+          <a:p>
+            <a:pPr lvl="1">
+              <a:buFontTx/>
+              <a:buChar char="-"/>
+            </a:pPr>
+            <a:endParaRPr lang="nl-BE" baseline="0" dirty="0" smtClean="0"/>
+          </a:p>
+          <a:p>
+            <a:pPr>
+              <a:buFontTx/>
+              <a:buChar char="-"/>
+            </a:pPr>
+            <a:endParaRPr lang="nl-BE" baseline="0" dirty="0" smtClean="0"/>
+          </a:p>
+          <a:p>
+            <a:pPr>
+              <a:buFontTx/>
+              <a:buChar char="-"/>
+            </a:pPr>
+            <a:endParaRPr lang="nl-BE" dirty="0" smtClean="0"/>
+          </a:p>
+        </p:txBody>
+      </p:sp>
+      <p:sp>
+        <p:nvSpPr>
+          <p:cNvPr id="4" name="Slide Number Placeholder 3"/>
+          <p:cNvSpPr>
+            <a:spLocks noGrp="1"/>
+          </p:cNvSpPr>
+          <p:nvPr>
+            <p:ph type="sldNum" sz="quarter" idx="10"/>
+          </p:nvPr>
+        </p:nvSpPr>
+        <p:spPr/>
+        <p:txBody>
+          <a:bodyPr/>
+          <a:lstStyle/>
+          <a:p>
+            <a:fld id="{A95F721D-B08F-41E9-83C2-423A43044BB2}" type="slidenum">
+              <a:rPr lang="nl-BE" smtClean="0"/>
+              <a:pPr/>
+              <a:t>28</a:t>
+            </a:fld>
+            <a:endParaRPr lang="nl-BE"/>
+          </a:p>
+        </p:txBody>
+      </p:sp>
+    </p:spTree>
+  </p:cSld>
+  <p:clrMapOvr>
+    <a:masterClrMapping/>
+  </p:clrMapOvr>
+</p:notes>
+</file>
+
+<file path=ppt/notesSlides/notesSlide28.xml><?xml version="1.0" encoding="utf-8"?>
+<p:notes xmlns:a="http://schemas.openxmlformats.org/drawingml/2006/main" xmlns:r="http://schemas.openxmlformats.org/officeDocument/2006/relationships" xmlns:p="http://schemas.openxmlformats.org/presentationml/2006/main">
+  <p:cSld>
+    <p:spTree>
+      <p:nvGrpSpPr>
+        <p:cNvPr id="1" name=""/>
+        <p:cNvGrpSpPr/>
+        <p:nvPr/>
+      </p:nvGrpSpPr>
+      <p:grpSpPr>
+        <a:xfrm>
+          <a:off x="0" y="0"/>
+          <a:ext cx="0" cy="0"/>
+          <a:chOff x="0" y="0"/>
+          <a:chExt cx="0" cy="0"/>
+        </a:xfrm>
+      </p:grpSpPr>
+      <p:sp>
+        <p:nvSpPr>
+          <p:cNvPr id="2" name="Slide Image Placeholder 1"/>
+          <p:cNvSpPr>
+            <a:spLocks noGrp="1" noRot="1" noChangeAspect="1"/>
+          </p:cNvSpPr>
+          <p:nvPr>
+            <p:ph type="sldImg"/>
+          </p:nvPr>
+        </p:nvSpPr>
+        <p:spPr/>
+      </p:sp>
+      <p:sp>
+        <p:nvSpPr>
+          <p:cNvPr id="3" name="Notes Placeholder 2"/>
+          <p:cNvSpPr>
+            <a:spLocks noGrp="1"/>
+          </p:cNvSpPr>
+          <p:nvPr>
+            <p:ph type="body" idx="1"/>
+          </p:nvPr>
+        </p:nvSpPr>
+        <p:spPr/>
+        <p:txBody>
+          <a:bodyPr>
+            <a:normAutofit/>
+          </a:bodyPr>
+          <a:lstStyle/>
+          <a:p>
             <a:pPr lvl="1">
               <a:buFontTx/>
               <a:buChar char="-"/>
@@ -2665,7 +3676,36 @@
           <a:p>
             <a:r>
               <a:rPr lang="nl-BE" dirty="0" smtClean="0"/>
-              <a:t>Our Business Case</a:t>
+              <a:t>Timeframe: 90 </a:t>
+            </a:r>
+            <a:r>
+              <a:rPr lang="nl-BE" dirty="0" smtClean="0"/>
+              <a:t>mins</a:t>
+            </a:r>
+          </a:p>
+          <a:p>
+            <a:endParaRPr lang="nl-BE" dirty="0" smtClean="0"/>
+          </a:p>
+          <a:p>
+            <a:r>
+              <a:rPr lang="nl-BE" dirty="0" smtClean="0"/>
+              <a:t>Don’t mind the </a:t>
+            </a:r>
+            <a:r>
+              <a:rPr lang="nl-BE" dirty="0" smtClean="0"/>
+              <a:t>timers we might use</a:t>
+            </a:r>
+            <a:r>
+              <a:rPr lang="nl-BE" baseline="0" dirty="0" smtClean="0"/>
+              <a:t> </a:t>
+            </a:r>
+            <a:r>
+              <a:rPr lang="nl-BE" dirty="0" smtClean="0"/>
+              <a:t>to help </a:t>
+            </a:r>
+            <a:r>
+              <a:rPr lang="nl-BE" dirty="0" smtClean="0"/>
+              <a:t>us keep our timings.</a:t>
             </a:r>
             <a:endParaRPr lang="nl-BE" dirty="0"/>
           </a:p>
@@ -2689,7 +3729,7 @@
             <a:fld id="{A95F721D-B08F-41E9-83C2-423A43044BB2}" type="slidenum">
               <a:rPr lang="nl-BE" smtClean="0"/>
               <a:pPr/>
-              <a:t>4</a:t>
+              <a:t>3</a:t>
             </a:fld>
             <a:endParaRPr lang="nl-BE"/>
           </a:p>
@@ -2751,7 +3791,7 @@
           <a:p>
             <a:r>
               <a:rPr lang="nl-BE" dirty="0" smtClean="0"/>
-              <a:t>Basic implementation -&gt; sketch</a:t>
+              <a:t>Our Business Case</a:t>
             </a:r>
             <a:endParaRPr lang="nl-BE" dirty="0"/>
           </a:p>
@@ -2775,7 +3815,7 @@
             <a:fld id="{A95F721D-B08F-41E9-83C2-423A43044BB2}" type="slidenum">
               <a:rPr lang="nl-BE" smtClean="0"/>
               <a:pPr/>
-              <a:t>5</a:t>
+              <a:t>4</a:t>
             </a:fld>
             <a:endParaRPr lang="nl-BE"/>
           </a:p>
@@ -2835,20 +3875,7 @@
           </a:bodyPr>
           <a:lstStyle/>
           <a:p>
-            <a:r>
-              <a:rPr lang="nl-BE" dirty="0" smtClean="0"/>
-              <a:t>Joe wants to order</a:t>
-            </a:r>
-            <a:r>
-              <a:rPr lang="nl-BE" baseline="0" dirty="0" smtClean="0"/>
-              <a:t> a sandwich.</a:t>
-            </a:r>
-          </a:p>
-          <a:p>
-            <a:r>
-              <a:rPr lang="nl-BE" baseline="0" dirty="0" smtClean="0"/>
-              <a:t>Joe gives €10 to Nancy, who logs on and adds the credits to Joe’s account.</a:t>
-            </a:r>
+            <a:endParaRPr lang="nl-BE" dirty="0"/>
           </a:p>
         </p:txBody>
       </p:sp>
@@ -2870,7 +3897,7 @@
             <a:fld id="{A95F721D-B08F-41E9-83C2-423A43044BB2}" type="slidenum">
               <a:rPr lang="nl-BE" smtClean="0"/>
               <a:pPr/>
-              <a:t>6</a:t>
+              <a:t>5</a:t>
             </a:fld>
             <a:endParaRPr lang="nl-BE"/>
           </a:p>
@@ -2932,15 +3959,26 @@
           <a:p>
             <a:r>
               <a:rPr lang="nl-BE" dirty="0" smtClean="0"/>
-              <a:t>Joe logs on and orders a Club Sandwich and a Tiramisu. He has €2 credit left.</a:t>
-            </a:r>
-          </a:p>
-          <a:p>
+              <a:t>Joe </a:t>
+            </a:r>
             <a:r>
               <a:rPr lang="nl-BE" dirty="0" smtClean="0"/>
-              <a:t>Nancy logs on again to print Today’s Orders.</a:t>
-            </a:r>
-            <a:endParaRPr lang="nl-BE" dirty="0"/>
+              <a:t>‘Developer’ wants </a:t>
+            </a:r>
+            <a:r>
+              <a:rPr lang="nl-BE" dirty="0" smtClean="0"/>
+              <a:t>to order</a:t>
+            </a:r>
+            <a:r>
+              <a:rPr lang="nl-BE" baseline="0" dirty="0" smtClean="0"/>
+              <a:t> a sandwich.</a:t>
+            </a:r>
+          </a:p>
+          <a:p>
+            <a:r>
+              <a:rPr lang="nl-BE" baseline="0" dirty="0" smtClean="0"/>
+              <a:t>Joe gives €10 to Nancy, who logs on and adds the credits to Joe’s account.</a:t>
+            </a:r>
           </a:p>
         </p:txBody>
       </p:sp>
@@ -2962,7 +4000,7 @@
             <a:fld id="{A95F721D-B08F-41E9-83C2-423A43044BB2}" type="slidenum">
               <a:rPr lang="nl-BE" smtClean="0"/>
               <a:pPr/>
-              <a:t>7</a:t>
+              <a:t>6</a:t>
             </a:fld>
             <a:endParaRPr lang="nl-BE"/>
           </a:p>
@@ -3022,6 +4060,27 @@
           </a:bodyPr>
           <a:lstStyle/>
           <a:p>
+            <a:r>
+              <a:rPr lang="nl-BE" dirty="0" smtClean="0"/>
+              <a:t>Joe logs on and orders a Club Sandwich and a Tiramisu. </a:t>
+            </a:r>
+            <a:endParaRPr lang="nl-BE" dirty="0" smtClean="0"/>
+          </a:p>
+          <a:p>
+            <a:r>
+              <a:rPr lang="nl-BE" dirty="0" smtClean="0"/>
+              <a:t>He </a:t>
+            </a:r>
+            <a:r>
+              <a:rPr lang="nl-BE" dirty="0" smtClean="0"/>
+              <a:t>has €2 credit left.</a:t>
+            </a:r>
+          </a:p>
+          <a:p>
+            <a:r>
+              <a:rPr lang="nl-BE" dirty="0" smtClean="0"/>
+              <a:t>Nancy logs on again to print Today’s Orders.</a:t>
+            </a:r>
             <a:endParaRPr lang="nl-BE" dirty="0"/>
           </a:p>
         </p:txBody>
@@ -3044,7 +4103,7 @@
             <a:fld id="{A95F721D-B08F-41E9-83C2-423A43044BB2}" type="slidenum">
               <a:rPr lang="nl-BE" smtClean="0"/>
               <a:pPr/>
-              <a:t>8</a:t>
+              <a:t>7</a:t>
             </a:fld>
             <a:endParaRPr lang="nl-BE"/>
           </a:p>
@@ -3104,98 +4163,7 @@
           </a:bodyPr>
           <a:lstStyle/>
           <a:p>
-            <a:r>
-              <a:rPr lang="nl-BE" u="sng" baseline="0" dirty="0" smtClean="0"/>
-              <a:t>First Story to order snacks:</a:t>
-            </a:r>
-          </a:p>
-          <a:p>
-            <a:r>
-              <a:rPr lang="nl-BE" baseline="0" dirty="0" smtClean="0"/>
-              <a:t>Implement 1st test: Order Snack for User With Insufficient Credit.</a:t>
-            </a:r>
-          </a:p>
-          <a:p>
-            <a:r>
-              <a:rPr lang="nl-BE" baseline="0" dirty="0" smtClean="0"/>
-              <a:t>Hand out the translation of the Specification Workshop to Fitnesse tables of the first test.</a:t>
-            </a:r>
-          </a:p>
-          <a:p>
-            <a:endParaRPr lang="nl-BE" baseline="0" dirty="0" smtClean="0"/>
-          </a:p>
-          <a:p>
-            <a:r>
-              <a:rPr lang="nl-BE" baseline="0" dirty="0" smtClean="0"/>
-              <a:t>Implement 2nd test: Order Snack for User With Enough Credit.</a:t>
-            </a:r>
-          </a:p>
-          <a:p>
-            <a:r>
-              <a:rPr lang="nl-BE" baseline="0" dirty="0" smtClean="0"/>
-              <a:t>  Without Get Today’s Orders. (RowFixture -&gt; in iteration 2)</a:t>
-            </a:r>
-          </a:p>
-          <a:p>
-            <a:r>
-              <a:rPr lang="nl-BE" baseline="0" dirty="0" smtClean="0"/>
-              <a:t>  Without checking the credit. (Return Values in DoFixture – in iteration 2)</a:t>
-            </a:r>
-          </a:p>
-          <a:p>
-            <a:endParaRPr lang="nl-BE" baseline="0" dirty="0" smtClean="0"/>
-          </a:p>
-          <a:p>
-            <a:r>
-              <a:rPr lang="nl-BE" baseline="0" dirty="0" smtClean="0"/>
-              <a:t>Use SetUp to Import Namespaces.</a:t>
-            </a:r>
-          </a:p>
-          <a:p>
-            <a:endParaRPr lang="nl-BE" baseline="0" dirty="0" smtClean="0"/>
-          </a:p>
-          <a:p>
-            <a:r>
-              <a:rPr lang="nl-BE" baseline="0" dirty="0" smtClean="0"/>
-              <a:t>Explain DoFixture</a:t>
-            </a:r>
-          </a:p>
-          <a:p>
-            <a:r>
-              <a:rPr lang="nl-BE" baseline="0" dirty="0" smtClean="0"/>
-              <a:t>Explain ColumnFixture</a:t>
-            </a:r>
-          </a:p>
-          <a:p>
-            <a:endParaRPr lang="nl-BE" baseline="0" dirty="0" smtClean="0"/>
-          </a:p>
-          <a:p>
-            <a:r>
-              <a:rPr lang="nl-BE" baseline="0" dirty="0" smtClean="0"/>
-              <a:t>Ask the green/red question which PO’s accept the first test? And the second? (they didn’t get the fixture print-out of the second)</a:t>
-            </a:r>
-          </a:p>
-          <a:p>
-            <a:endParaRPr lang="nl-BE" baseline="0" dirty="0" smtClean="0"/>
-          </a:p>
-          <a:p>
-            <a:r>
-              <a:rPr lang="nl-BE" baseline="0" dirty="0" smtClean="0"/>
-              <a:t>1st tests gets accepted by Product Owner.</a:t>
-            </a:r>
-          </a:p>
-          <a:p>
-            <a:r>
-              <a:rPr lang="nl-BE" baseline="0" dirty="0" smtClean="0"/>
-              <a:t>2nd is not accepted -&gt; not complete According to Acceptance Criteria on the User Story. (too bad </a:t>
-            </a:r>
-            <a:r>
-              <a:rPr lang="nl-BE" baseline="0" dirty="0" smtClean="0">
-                <a:sym typeface="Wingdings" pitchFamily="2" charset="2"/>
-              </a:rPr>
-              <a:t>)</a:t>
-            </a:r>
-            <a:endParaRPr lang="nl-BE" baseline="0" dirty="0" smtClean="0"/>
+            <a:endParaRPr lang="nl-BE" dirty="0"/>
           </a:p>
         </p:txBody>
       </p:sp>
@@ -3217,7 +4185,7 @@
             <a:fld id="{A95F721D-B08F-41E9-83C2-423A43044BB2}" type="slidenum">
               <a:rPr lang="nl-BE" smtClean="0"/>
               <a:pPr/>
-              <a:t>9</a:t>
+              <a:t>8</a:t>
             </a:fld>
             <a:endParaRPr lang="nl-BE"/>
           </a:p>
@@ -3273,166 +4241,14 @@
         <p:spPr/>
         <p:txBody>
           <a:bodyPr>
-            <a:normAutofit lnSpcReduction="10000"/>
+            <a:normAutofit/>
           </a:bodyPr>
           <a:lstStyle/>
           <a:p>
             <a:r>
-              <a:rPr lang="nl-BE" u="sng" dirty="0" smtClean="0"/>
-              <a:t>Praktische zaken: </a:t>
-            </a:r>
-          </a:p>
-          <a:p>
-            <a:r>
-              <a:rPr lang="nl-BE" u="none" dirty="0" smtClean="0"/>
-              <a:t>-</a:t>
-            </a:r>
-            <a:r>
-              <a:rPr lang="nl-BE" u="none" baseline="0" dirty="0" smtClean="0"/>
-              <a:t>Vooraleer we beginnen aan deze korte workshop vragen we wie er straks mee wil coderen op zijn eigen laptop. </a:t>
-            </a:r>
-          </a:p>
-          <a:p>
-            <a:r>
-              <a:rPr lang="nl-BE" u="none" baseline="0" dirty="0" smtClean="0"/>
-              <a:t>-Deze personen vragen we hun laptop nu op te starten en de inhoud van de share te kopiëren naar hun laptop. (via GetLatest.bat)</a:t>
-            </a:r>
-          </a:p>
-          <a:p>
-            <a:r>
-              <a:rPr lang="nl-BE" u="none" baseline="0" dirty="0" smtClean="0"/>
-              <a:t>- We vermelden dat we niets installeren op de mensen hun laptops gedurende de ganse sessie (enkel xcopy deployment)</a:t>
-            </a:r>
-          </a:p>
-          <a:p>
-            <a:r>
-              <a:rPr lang="nl-BE" u="none" baseline="0" dirty="0" smtClean="0"/>
-              <a:t>	</a:t>
-            </a:r>
-            <a:endParaRPr lang="nl-BE" u="sng" baseline="0" dirty="0" smtClean="0"/>
-          </a:p>
-          <a:p>
-            <a:r>
-              <a:rPr lang="nl-BE" u="sng" baseline="0" dirty="0" smtClean="0"/>
-              <a:t>De workshop zelf:</a:t>
-            </a:r>
-          </a:p>
-          <a:p>
-            <a:r>
-              <a:rPr lang="nl-BE" u="none" baseline="0" dirty="0" smtClean="0"/>
-              <a:t>-Verdelen van de aanwezigen in groepjes van 4. (liefst heterogeen)</a:t>
-            </a:r>
-            <a:endParaRPr lang="nl-BE" u="none" dirty="0" smtClean="0"/>
-          </a:p>
-          <a:p>
-            <a:pPr>
-              <a:buFontTx/>
-              <a:buChar char="-"/>
-            </a:pPr>
-            <a:r>
-              <a:rPr lang="nl-BE" dirty="0" smtClean="0"/>
-              <a:t>We delen een index card van beide stories uit </a:t>
-            </a:r>
-            <a:r>
-              <a:rPr lang="nl-BE" baseline="0" dirty="0" smtClean="0"/>
-              <a:t>aan elk groepje.</a:t>
-            </a:r>
-          </a:p>
-          <a:p>
-            <a:pPr>
-              <a:buFontTx/>
-              <a:buChar char="-"/>
-            </a:pPr>
-            <a:r>
-              <a:rPr lang="nl-BE" baseline="0" dirty="0" smtClean="0"/>
-              <a:t>We delen ook een voorbeeld uit zodanig dat de deelnemers weten wat van hun verwacht wordt.</a:t>
-            </a:r>
-          </a:p>
-          <a:p>
-            <a:pPr>
-              <a:buFontTx/>
-              <a:buChar char="-"/>
-            </a:pPr>
-            <a:r>
-              <a:rPr lang="nl-BE" baseline="0" dirty="0" smtClean="0"/>
-              <a:t>Op het ene scherm laten we deze slide zien. (Pascal)</a:t>
-            </a:r>
-          </a:p>
-          <a:p>
-            <a:pPr>
-              <a:buFontTx/>
-              <a:buChar char="-"/>
-            </a:pPr>
-            <a:r>
-              <a:rPr lang="nl-BE" baseline="0" dirty="0" smtClean="0"/>
-              <a:t>Op de andere starten we de countdown timer van ZoomIt om 10 minuten wanneer de uitleg gedaan is en de groepjes gemaakt zijn. (Michel)</a:t>
-            </a:r>
-          </a:p>
-          <a:p>
-            <a:pPr>
-              <a:buFontTx/>
-              <a:buChar char="-"/>
-            </a:pPr>
-            <a:r>
-              <a:rPr lang="nl-BE" dirty="0" smtClean="0"/>
-              <a:t>De</a:t>
-            </a:r>
-            <a:r>
-              <a:rPr lang="nl-BE" baseline="0" dirty="0" smtClean="0"/>
-              <a:t> mensen krijgen A4 papier en stiften ter beschikking om hun real world voorbeelden te noteren.</a:t>
-            </a:r>
-          </a:p>
-          <a:p>
-            <a:pPr>
-              <a:buFontTx/>
-              <a:buChar char="-"/>
-            </a:pPr>
-            <a:endParaRPr lang="nl-BE" baseline="0" dirty="0" smtClean="0"/>
-          </a:p>
-          <a:p>
-            <a:r>
-              <a:rPr lang="en-US" sz="1300" u="sng" dirty="0" smtClean="0"/>
-              <a:t>Some good questions to kick it off:</a:t>
-            </a:r>
-          </a:p>
-          <a:p>
-            <a:r>
-              <a:rPr lang="en-US" sz="1300" dirty="0" smtClean="0"/>
-              <a:t>- How do we verify that this thing we are going to write is implemented </a:t>
-            </a:r>
-            <a:r>
-              <a:rPr lang="nl-BE" sz="1300" b="1" dirty="0" smtClean="0"/>
-              <a:t>completely and correctly?</a:t>
-            </a:r>
-          </a:p>
-          <a:p>
-            <a:pPr>
-              <a:buFontTx/>
-              <a:buChar char="-"/>
-            </a:pPr>
-            <a:r>
-              <a:rPr lang="en-US" sz="1300" dirty="0" smtClean="0"/>
-              <a:t> Can you give us a few </a:t>
-            </a:r>
-            <a:r>
-              <a:rPr lang="en-US" sz="1300" b="1" dirty="0" smtClean="0"/>
-              <a:t>examples?</a:t>
-            </a:r>
-          </a:p>
-          <a:p>
-            <a:pPr>
-              <a:buFontTx/>
-              <a:buChar char="-"/>
-            </a:pPr>
-            <a:r>
-              <a:rPr lang="en-US" sz="1300" dirty="0" smtClean="0"/>
-              <a:t> Pretend it's magic and it's already delivered – </a:t>
-            </a:r>
-            <a:r>
-              <a:rPr lang="en-US" sz="1300" b="1" dirty="0" smtClean="0"/>
-              <a:t>how would you test it?</a:t>
-            </a:r>
-            <a:endParaRPr lang="nl-BE" dirty="0"/>
+              <a:rPr lang="nl-BE" b="1" u="none" baseline="0" dirty="0" smtClean="0"/>
+              <a:t>Start Iteration Timer: 35’</a:t>
+            </a:r>
           </a:p>
         </p:txBody>
       </p:sp>
@@ -3454,7 +4270,7 @@
             <a:fld id="{A95F721D-B08F-41E9-83C2-423A43044BB2}" type="slidenum">
               <a:rPr lang="nl-BE" smtClean="0"/>
               <a:pPr/>
-              <a:t>11</a:t>
+              <a:t>9</a:t>
             </a:fld>
             <a:endParaRPr lang="nl-BE"/>
           </a:p>
@@ -4094,7 +4910,7 @@
             <a:fld id="{FB938823-3E05-40BA-BF51-A1BB5DC0A85F}" type="datetimeFigureOut">
               <a:rPr lang="nl-BE" smtClean="0"/>
               <a:pPr/>
-              <a:t>03/11/2009</a:t>
+              <a:t>22/11/2009</a:t>
             </a:fld>
             <a:endParaRPr lang="nl-BE"/>
           </a:p>
@@ -4292,7 +5108,7 @@
             <a:fld id="{FB938823-3E05-40BA-BF51-A1BB5DC0A85F}" type="datetimeFigureOut">
               <a:rPr lang="nl-BE" smtClean="0"/>
               <a:pPr/>
-              <a:t>03/11/2009</a:t>
+              <a:t>22/11/2009</a:t>
             </a:fld>
             <a:endParaRPr lang="nl-BE"/>
           </a:p>
@@ -4479,7 +5295,7 @@
             <a:fld id="{FB938823-3E05-40BA-BF51-A1BB5DC0A85F}" type="datetimeFigureOut">
               <a:rPr lang="nl-BE" smtClean="0"/>
               <a:pPr/>
-              <a:t>03/11/2009</a:t>
+              <a:t>22/11/2009</a:t>
             </a:fld>
             <a:endParaRPr lang="nl-BE"/>
           </a:p>
@@ -4631,7 +5447,7 @@
             <a:fld id="{FB938823-3E05-40BA-BF51-A1BB5DC0A85F}" type="datetimeFigureOut">
               <a:rPr lang="nl-BE" smtClean="0"/>
               <a:pPr/>
-              <a:t>03/11/2009</a:t>
+              <a:t>22/11/2009</a:t>
             </a:fld>
             <a:endParaRPr lang="nl-BE"/>
           </a:p>
@@ -4888,7 +5704,7 @@
             <a:fld id="{FB938823-3E05-40BA-BF51-A1BB5DC0A85F}" type="datetimeFigureOut">
               <a:rPr lang="nl-BE" smtClean="0"/>
               <a:pPr/>
-              <a:t>03/11/2009</a:t>
+              <a:t>22/11/2009</a:t>
             </a:fld>
             <a:endParaRPr lang="nl-BE"/>
           </a:p>
@@ -5299,7 +6115,7 @@
             <a:fld id="{FB938823-3E05-40BA-BF51-A1BB5DC0A85F}" type="datetimeFigureOut">
               <a:rPr lang="nl-BE" smtClean="0"/>
               <a:pPr/>
-              <a:t>03/11/2009</a:t>
+              <a:t>22/11/2009</a:t>
             </a:fld>
             <a:endParaRPr lang="nl-BE"/>
           </a:p>
@@ -5747,7 +6563,7 @@
             <a:fld id="{FB938823-3E05-40BA-BF51-A1BB5DC0A85F}" type="datetimeFigureOut">
               <a:rPr lang="nl-BE" smtClean="0"/>
               <a:pPr/>
-              <a:t>03/11/2009</a:t>
+              <a:t>22/11/2009</a:t>
             </a:fld>
             <a:endParaRPr lang="nl-BE"/>
           </a:p>
@@ -5850,7 +6666,7 @@
             <a:fld id="{FB938823-3E05-40BA-BF51-A1BB5DC0A85F}" type="datetimeFigureOut">
               <a:rPr lang="nl-BE" smtClean="0"/>
               <a:pPr/>
-              <a:t>03/11/2009</a:t>
+              <a:t>22/11/2009</a:t>
             </a:fld>
             <a:endParaRPr lang="nl-BE"/>
           </a:p>
@@ -5973,7 +6789,7 @@
             <a:fld id="{FB938823-3E05-40BA-BF51-A1BB5DC0A85F}" type="datetimeFigureOut">
               <a:rPr lang="nl-BE" smtClean="0"/>
               <a:pPr/>
-              <a:t>03/11/2009</a:t>
+              <a:t>22/11/2009</a:t>
             </a:fld>
             <a:endParaRPr lang="nl-BE"/>
           </a:p>
@@ -6249,7 +7065,7 @@
             <a:fld id="{FB938823-3E05-40BA-BF51-A1BB5DC0A85F}" type="datetimeFigureOut">
               <a:rPr lang="nl-BE" smtClean="0"/>
               <a:pPr/>
-              <a:t>03/11/2009</a:t>
+              <a:t>22/11/2009</a:t>
             </a:fld>
             <a:endParaRPr lang="nl-BE"/>
           </a:p>
@@ -6456,7 +7272,7 @@
             <a:fld id="{FB938823-3E05-40BA-BF51-A1BB5DC0A85F}" type="datetimeFigureOut">
               <a:rPr lang="nl-BE" smtClean="0"/>
               <a:pPr/>
-              <a:t>03/11/2009</a:t>
+              <a:t>22/11/2009</a:t>
             </a:fld>
             <a:endParaRPr lang="nl-BE"/>
           </a:p>
@@ -7567,7 +8383,7 @@
             <a:fld id="{FB938823-3E05-40BA-BF51-A1BB5DC0A85F}" type="datetimeFigureOut">
               <a:rPr lang="nl-BE" smtClean="0"/>
               <a:pPr/>
-              <a:t>03/11/2009</a:t>
+              <a:t>22/11/2009</a:t>
             </a:fld>
             <a:endParaRPr lang="nl-BE"/>
           </a:p>
@@ -8117,7 +8933,7 @@
           <p:nvPr/>
         </p:nvPicPr>
         <p:blipFill>
-          <a:blip r:embed="rId2" cstate="print"/>
+          <a:blip r:embed="rId3" cstate="print"/>
           <a:srcRect/>
           <a:stretch>
             <a:fillRect/>
@@ -9163,6 +9979,24 @@
               <a:defRPr/>
             </a:pPr>
             <a:r>
+              <a:rPr lang="nl-BE" sz="4100" b="1" noProof="0" dirty="0" smtClean="0">
+                <a:solidFill>
+                  <a:schemeClr val="tx2"/>
+                </a:solidFill>
+                <a:effectLst>
+                  <a:outerShdw blurRad="31750" dist="25400" dir="5400000" algn="tl" rotWithShape="0">
+                    <a:srgbClr val="000000">
+                      <a:alpha val="25000"/>
+                    </a:srgbClr>
+                  </a:outerShdw>
+                </a:effectLst>
+                <a:latin typeface="+mj-lt"/>
+                <a:ea typeface="+mj-ea"/>
+                <a:cs typeface="+mj-cs"/>
+              </a:rPr>
+              <a:t>30</a:t>
+            </a:r>
+            <a:r>
               <a:rPr kumimoji="0" lang="nl-BE" sz="4100" b="1" i="0" u="none" strike="noStrike" kern="1200" cap="none" spc="0" normalizeH="0" baseline="0" noProof="0" dirty="0" smtClean="0">
                 <a:ln>
                   <a:noFill/>
@@ -9183,7 +10017,7 @@
                 <a:ea typeface="+mj-ea"/>
                 <a:cs typeface="+mj-cs"/>
               </a:rPr>
-              <a:t>30’</a:t>
+              <a:t>’</a:t>
             </a:r>
             <a:endParaRPr kumimoji="0" lang="nl-BE" sz="4100" b="1" i="0" u="none" strike="noStrike" kern="1200" cap="none" spc="0" normalizeH="0" baseline="0" noProof="0" dirty="0">
               <a:ln>
@@ -12782,25 +13616,12 @@
             <a:pPr lvl="1"/>
             <a:r>
               <a:rPr lang="nl-BE" dirty="0" smtClean="0">
-                <a:hlinkClick r:id="rId2"/>
+                <a:hlinkClick r:id="rId3"/>
               </a:rPr>
               <a:t>http://fitnesse.org/</a:t>
             </a:r>
             <a:r>
               <a:rPr lang="nl-BE" dirty="0" smtClean="0"/>
-              <a:t> </a:t>
-            </a:r>
-          </a:p>
-          <a:p>
-            <a:pPr lvl="1"/>
-            <a:r>
-              <a:rPr lang="en-US" sz="2400" dirty="0" smtClean="0">
-                <a:hlinkClick r:id="rId3"/>
-              </a:rPr>
-              <a:t>http://sourceforge.net/projects/fitlibrary/</a:t>
-            </a:r>
-            <a:r>
-              <a:rPr lang="en-US" sz="2400" dirty="0" smtClean="0"/>
               <a:t> </a:t>
             </a:r>
           </a:p>
@@ -12810,6 +13631,19 @@
               <a:rPr lang="en-US" sz="2400" dirty="0" smtClean="0">
                 <a:hlinkClick r:id="rId4"/>
               </a:rPr>
+              <a:t>http://sourceforge.net/projects/fitlibrary/</a:t>
+            </a:r>
+            <a:r>
+              <a:rPr lang="en-US" sz="2400" dirty="0" smtClean="0"/>
+              <a:t> </a:t>
+            </a:r>
+          </a:p>
+          <a:p>
+            <a:pPr lvl="1"/>
+            <a:r>
+              <a:rPr lang="en-US" sz="2400" dirty="0" smtClean="0">
+                <a:hlinkClick r:id="rId5"/>
+              </a:rPr>
               <a:t>http://gojko.net/</a:t>
             </a:r>
             <a:r>
@@ -12821,7 +13655,7 @@
             <a:pPr lvl="1"/>
             <a:r>
               <a:rPr lang="nl-BE" sz="2400" dirty="0" smtClean="0">
-                <a:hlinkClick r:id="rId5"/>
+                <a:hlinkClick r:id="rId6"/>
               </a:rPr>
               <a:t>http://codebetter.com/blogs/ian_cooper/archive/2008/10/13/fitnesse-and-the-three-way.aspx</a:t>
             </a:r>
@@ -12834,7 +13668,7 @@
             <a:pPr lvl="1"/>
             <a:r>
               <a:rPr lang="nl-BE" sz="2000" dirty="0" smtClean="0">
-                <a:hlinkClick r:id="rId6"/>
+                <a:hlinkClick r:id="rId7"/>
               </a:rPr>
               <a:t>http://gojko.net/2008/09/17/fitting-agile-acceptance-testing-into-the-development-process/</a:t>
             </a:r>
@@ -12857,7 +13691,7 @@
             <a:pPr lvl="1"/>
             <a:r>
               <a:rPr lang="en-US" sz="2400" dirty="0" smtClean="0">
-                <a:hlinkClick r:id="rId7"/>
+                <a:hlinkClick r:id="rId8"/>
               </a:rPr>
               <a:t>http://tech.groups.yahoo.com/group/fitnesse/</a:t>
             </a:r>
@@ -12904,7 +13738,7 @@
           <p:nvPr/>
         </p:nvPicPr>
         <p:blipFill>
-          <a:blip r:embed="rId8" cstate="print"/>
+          <a:blip r:embed="rId9" cstate="print"/>
           <a:srcRect/>
           <a:stretch>
             <a:fillRect/>
@@ -12936,7 +13770,7 @@
           <p:nvPr/>
         </p:nvPicPr>
         <p:blipFill>
-          <a:blip r:embed="rId9" cstate="print"/>
+          <a:blip r:embed="rId10" cstate="print"/>
           <a:srcRect/>
           <a:stretch>
             <a:fillRect/>
@@ -12968,7 +13802,7 @@
           <p:nvPr/>
         </p:nvPicPr>
         <p:blipFill>
-          <a:blip r:embed="rId10" cstate="print"/>
+          <a:blip r:embed="rId11" cstate="print"/>
           <a:srcRect/>
           <a:stretch>
             <a:fillRect/>
@@ -13001,7 +13835,7 @@
           <p:nvPr/>
         </p:nvPicPr>
         <p:blipFill>
-          <a:blip r:embed="rId11" cstate="print"/>
+          <a:blip r:embed="rId12" cstate="print"/>
           <a:srcRect/>
           <a:stretch>
             <a:fillRect/>
@@ -13034,7 +13868,7 @@
           <p:nvPr/>
         </p:nvPicPr>
         <p:blipFill>
-          <a:blip r:embed="rId12" cstate="print"/>
+          <a:blip r:embed="rId13" cstate="print"/>
           <a:srcRect/>
           <a:stretch>
             <a:fillRect/>
@@ -13680,7 +14514,7 @@
           <p:nvPr/>
         </p:nvPicPr>
         <p:blipFill>
-          <a:blip r:embed="rId2" cstate="print"/>
+          <a:blip r:embed="rId3" cstate="print"/>
           <a:srcRect/>
           <a:stretch>
             <a:fillRect/>

</xml_diff>